<commit_message>
make shorter within 13 pages
</commit_message>
<xml_diff>
--- a/pptx/fig3.pptx
+++ b/pptx/fig3.pptx
@@ -106,7 +106,7 @@
   </p:defaultTextStyle>
   <p:extLst>
     <p:ext uri="{EFAFB233-063F-42B5-8137-9DF3F51BA10A}">
-      <p15:sldGuideLst xmlns:p15="http://schemas.microsoft.com/office/powerpoint/2012/main"/>
+      <p15:sldGuideLst xmlns:p15="http://schemas.microsoft.com/office/powerpoint/2012/main" xmlns=""/>
     </p:ext>
   </p:extLst>
 </p:presentation>
@@ -243,7 +243,7 @@
           <a:p>
             <a:fld id="{B81EF0E6-7456-45B9-A9E8-FB65E7325BBE}" type="datetimeFigureOut">
               <a:rPr lang="zh-CN" altLang="en-US" smtClean="0"/>
-              <a:t>2015/4/28</a:t>
+              <a:t>15/5/10</a:t>
             </a:fld>
             <a:endParaRPr lang="zh-CN" altLang="en-US"/>
           </a:p>
@@ -413,7 +413,7 @@
           <a:p>
             <a:fld id="{B81EF0E6-7456-45B9-A9E8-FB65E7325BBE}" type="datetimeFigureOut">
               <a:rPr lang="zh-CN" altLang="en-US" smtClean="0"/>
-              <a:t>2015/4/28</a:t>
+              <a:t>15/5/10</a:t>
             </a:fld>
             <a:endParaRPr lang="zh-CN" altLang="en-US"/>
           </a:p>
@@ -593,7 +593,7 @@
           <a:p>
             <a:fld id="{B81EF0E6-7456-45B9-A9E8-FB65E7325BBE}" type="datetimeFigureOut">
               <a:rPr lang="zh-CN" altLang="en-US" smtClean="0"/>
-              <a:t>2015/4/28</a:t>
+              <a:t>15/5/10</a:t>
             </a:fld>
             <a:endParaRPr lang="zh-CN" altLang="en-US"/>
           </a:p>
@@ -763,7 +763,7 @@
           <a:p>
             <a:fld id="{B81EF0E6-7456-45B9-A9E8-FB65E7325BBE}" type="datetimeFigureOut">
               <a:rPr lang="zh-CN" altLang="en-US" smtClean="0"/>
-              <a:t>2015/4/28</a:t>
+              <a:t>15/5/10</a:t>
             </a:fld>
             <a:endParaRPr lang="zh-CN" altLang="en-US"/>
           </a:p>
@@ -1009,7 +1009,7 @@
           <a:p>
             <a:fld id="{B81EF0E6-7456-45B9-A9E8-FB65E7325BBE}" type="datetimeFigureOut">
               <a:rPr lang="zh-CN" altLang="en-US" smtClean="0"/>
-              <a:t>2015/4/28</a:t>
+              <a:t>15/5/10</a:t>
             </a:fld>
             <a:endParaRPr lang="zh-CN" altLang="en-US"/>
           </a:p>
@@ -1241,7 +1241,7 @@
           <a:p>
             <a:fld id="{B81EF0E6-7456-45B9-A9E8-FB65E7325BBE}" type="datetimeFigureOut">
               <a:rPr lang="zh-CN" altLang="en-US" smtClean="0"/>
-              <a:t>2015/4/28</a:t>
+              <a:t>15/5/10</a:t>
             </a:fld>
             <a:endParaRPr lang="zh-CN" altLang="en-US"/>
           </a:p>
@@ -1608,7 +1608,7 @@
           <a:p>
             <a:fld id="{B81EF0E6-7456-45B9-A9E8-FB65E7325BBE}" type="datetimeFigureOut">
               <a:rPr lang="zh-CN" altLang="en-US" smtClean="0"/>
-              <a:t>2015/4/28</a:t>
+              <a:t>15/5/10</a:t>
             </a:fld>
             <a:endParaRPr lang="zh-CN" altLang="en-US"/>
           </a:p>
@@ -1726,7 +1726,7 @@
           <a:p>
             <a:fld id="{B81EF0E6-7456-45B9-A9E8-FB65E7325BBE}" type="datetimeFigureOut">
               <a:rPr lang="zh-CN" altLang="en-US" smtClean="0"/>
-              <a:t>2015/4/28</a:t>
+              <a:t>15/5/10</a:t>
             </a:fld>
             <a:endParaRPr lang="zh-CN" altLang="en-US"/>
           </a:p>
@@ -1821,7 +1821,7 @@
           <a:p>
             <a:fld id="{B81EF0E6-7456-45B9-A9E8-FB65E7325BBE}" type="datetimeFigureOut">
               <a:rPr lang="zh-CN" altLang="en-US" smtClean="0"/>
-              <a:t>2015/4/28</a:t>
+              <a:t>15/5/10</a:t>
             </a:fld>
             <a:endParaRPr lang="zh-CN" altLang="en-US"/>
           </a:p>
@@ -2098,7 +2098,7 @@
           <a:p>
             <a:fld id="{B81EF0E6-7456-45B9-A9E8-FB65E7325BBE}" type="datetimeFigureOut">
               <a:rPr lang="zh-CN" altLang="en-US" smtClean="0"/>
-              <a:t>2015/4/28</a:t>
+              <a:t>15/5/10</a:t>
             </a:fld>
             <a:endParaRPr lang="zh-CN" altLang="en-US"/>
           </a:p>
@@ -2355,7 +2355,7 @@
           <a:p>
             <a:fld id="{B81EF0E6-7456-45B9-A9E8-FB65E7325BBE}" type="datetimeFigureOut">
               <a:rPr lang="zh-CN" altLang="en-US" smtClean="0"/>
-              <a:t>2015/4/28</a:t>
+              <a:t>15/5/10</a:t>
             </a:fld>
             <a:endParaRPr lang="zh-CN" altLang="en-US"/>
           </a:p>
@@ -2568,7 +2568,7 @@
           <a:p>
             <a:fld id="{B81EF0E6-7456-45B9-A9E8-FB65E7325BBE}" type="datetimeFigureOut">
               <a:rPr lang="zh-CN" altLang="en-US" smtClean="0"/>
-              <a:t>2015/4/28</a:t>
+              <a:t>15/5/10</a:t>
             </a:fld>
             <a:endParaRPr lang="zh-CN" altLang="en-US"/>
           </a:p>
@@ -3119,8 +3119,8 @@
         </p:nvSpPr>
         <p:spPr>
           <a:xfrm>
-            <a:off x="478963" y="1209031"/>
-            <a:ext cx="309700" cy="230832"/>
+            <a:off x="1275888" y="1209031"/>
+            <a:ext cx="338554" cy="261610"/>
           </a:xfrm>
           <a:prstGeom prst="rect">
             <a:avLst/>
@@ -3137,43 +3137,10 @@
           <a:lstStyle/>
           <a:p>
             <a:r>
-              <a:rPr lang="en-US" altLang="zh-CN" sz="900" dirty="0" smtClean="0"/>
+              <a:rPr lang="en-US" altLang="zh-CN" sz="1100" dirty="0" smtClean="0"/>
               <a:t>(a)</a:t>
             </a:r>
-            <a:endParaRPr lang="zh-CN" altLang="en-US" sz="900" dirty="0"/>
-          </a:p>
-        </p:txBody>
-      </p:sp>
-      <p:sp>
-        <p:nvSpPr>
-          <p:cNvPr id="8" name="文本框 7"/>
-          <p:cNvSpPr txBox="1"/>
-          <p:nvPr/>
-        </p:nvSpPr>
-        <p:spPr>
-          <a:xfrm>
-            <a:off x="2092694" y="1209031"/>
-            <a:ext cx="316112" cy="230832"/>
-          </a:xfrm>
-          <a:prstGeom prst="rect">
-            <a:avLst/>
-          </a:prstGeom>
-          <a:noFill/>
-          <a:ln w="19050">
-            <a:noFill/>
-          </a:ln>
-        </p:spPr>
-        <p:txBody>
-          <a:bodyPr wrap="none" rtlCol="0">
-            <a:spAutoFit/>
-          </a:bodyPr>
-          <a:lstStyle/>
-          <a:p>
-            <a:r>
-              <a:rPr lang="en-US" altLang="zh-CN" sz="900" dirty="0" smtClean="0"/>
-              <a:t>(b)</a:t>
-            </a:r>
-            <a:endParaRPr lang="zh-CN" altLang="en-US" sz="900" dirty="0"/>
+            <a:endParaRPr lang="zh-CN" altLang="en-US" sz="1100" dirty="0"/>
           </a:p>
         </p:txBody>
       </p:sp>
@@ -3223,1273 +3190,1298 @@
           </a:p>
         </p:txBody>
       </p:sp>
-      <p:grpSp>
-        <p:nvGrpSpPr>
-          <p:cNvPr id="19" name="组合 18"/>
-          <p:cNvGrpSpPr/>
+      <p:sp>
+        <p:nvSpPr>
+          <p:cNvPr id="2" name="矩形 1"/>
+          <p:cNvSpPr/>
           <p:nvPr/>
-        </p:nvGrpSpPr>
-        <p:grpSpPr>
+        </p:nvSpPr>
+        <p:spPr>
           <a:xfrm>
-            <a:off x="1822703" y="210790"/>
-            <a:ext cx="861006" cy="746706"/>
-            <a:chOff x="1822703" y="210790"/>
-            <a:chExt cx="861006" cy="746706"/>
+            <a:off x="2207665" y="210789"/>
+            <a:ext cx="21600" cy="21600"/>
           </a:xfrm>
-        </p:grpSpPr>
-        <p:sp>
-          <p:nvSpPr>
-            <p:cNvPr id="2" name="矩形 1"/>
-            <p:cNvSpPr/>
-            <p:nvPr/>
-          </p:nvSpPr>
-          <p:spPr>
-            <a:xfrm>
-              <a:off x="2207665" y="210790"/>
-              <a:ext cx="45719" cy="45719"/>
-            </a:xfrm>
-            <a:prstGeom prst="rect">
+          <a:prstGeom prst="rect">
+            <a:avLst/>
+          </a:prstGeom>
+          <a:solidFill>
+            <a:schemeClr val="bg1">
+              <a:lumMod val="50000"/>
+            </a:schemeClr>
+          </a:solidFill>
+          <a:ln>
+            <a:solidFill>
+              <a:schemeClr val="tx1"/>
+            </a:solidFill>
+          </a:ln>
+        </p:spPr>
+        <p:style>
+          <a:lnRef idx="2">
+            <a:schemeClr val="accent1">
+              <a:shade val="50000"/>
+            </a:schemeClr>
+          </a:lnRef>
+          <a:fillRef idx="1">
+            <a:schemeClr val="accent1"/>
+          </a:fillRef>
+          <a:effectRef idx="0">
+            <a:schemeClr val="accent1"/>
+          </a:effectRef>
+          <a:fontRef idx="minor">
+            <a:schemeClr val="lt1"/>
+          </a:fontRef>
+        </p:style>
+        <p:txBody>
+          <a:bodyPr rtlCol="0" anchor="ctr"/>
+          <a:lstStyle/>
+          <a:p>
+            <a:pPr algn="ctr"/>
+            <a:endParaRPr lang="zh-CN" altLang="en-US"/>
+          </a:p>
+        </p:txBody>
+      </p:sp>
+      <p:sp>
+        <p:nvSpPr>
+          <p:cNvPr id="10" name="矩形 9"/>
+          <p:cNvSpPr/>
+          <p:nvPr/>
+        </p:nvSpPr>
+        <p:spPr>
+          <a:xfrm>
+            <a:off x="2295059" y="236533"/>
+            <a:ext cx="21600" cy="21600"/>
+          </a:xfrm>
+          <a:prstGeom prst="rect">
+            <a:avLst/>
+          </a:prstGeom>
+          <a:solidFill>
+            <a:schemeClr val="bg1">
+              <a:lumMod val="50000"/>
+            </a:schemeClr>
+          </a:solidFill>
+          <a:ln>
+            <a:solidFill>
+              <a:schemeClr val="tx1"/>
+            </a:solidFill>
+          </a:ln>
+        </p:spPr>
+        <p:style>
+          <a:lnRef idx="2">
+            <a:schemeClr val="accent1">
+              <a:shade val="50000"/>
+            </a:schemeClr>
+          </a:lnRef>
+          <a:fillRef idx="1">
+            <a:schemeClr val="accent1"/>
+          </a:fillRef>
+          <a:effectRef idx="0">
+            <a:schemeClr val="accent1"/>
+          </a:effectRef>
+          <a:fontRef idx="minor">
+            <a:schemeClr val="lt1"/>
+          </a:fontRef>
+        </p:style>
+        <p:txBody>
+          <a:bodyPr rtlCol="0" anchor="ctr"/>
+          <a:lstStyle/>
+          <a:p>
+            <a:pPr algn="ctr"/>
+            <a:endParaRPr lang="zh-CN" altLang="en-US"/>
+          </a:p>
+        </p:txBody>
+      </p:sp>
+      <p:sp>
+        <p:nvSpPr>
+          <p:cNvPr id="11" name="矩形 10"/>
+          <p:cNvSpPr/>
+          <p:nvPr/>
+        </p:nvSpPr>
+        <p:spPr>
+          <a:xfrm>
+            <a:off x="2100528" y="445591"/>
+            <a:ext cx="21600" cy="21600"/>
+          </a:xfrm>
+          <a:prstGeom prst="rect">
+            <a:avLst/>
+          </a:prstGeom>
+          <a:solidFill>
+            <a:schemeClr val="bg1">
+              <a:lumMod val="50000"/>
+            </a:schemeClr>
+          </a:solidFill>
+          <a:ln>
+            <a:solidFill>
+              <a:schemeClr val="tx1"/>
+            </a:solidFill>
+          </a:ln>
+        </p:spPr>
+        <p:style>
+          <a:lnRef idx="2">
+            <a:schemeClr val="accent1">
+              <a:shade val="50000"/>
+            </a:schemeClr>
+          </a:lnRef>
+          <a:fillRef idx="1">
+            <a:schemeClr val="accent1"/>
+          </a:fillRef>
+          <a:effectRef idx="0">
+            <a:schemeClr val="accent1"/>
+          </a:effectRef>
+          <a:fontRef idx="minor">
+            <a:schemeClr val="lt1"/>
+          </a:fontRef>
+        </p:style>
+        <p:txBody>
+          <a:bodyPr rot="0" spcFirstLastPara="0" vert="horz" wrap="square" lIns="91440" tIns="45720" rIns="91440" bIns="45720" numCol="1" spcCol="0" rtlCol="0" fromWordArt="0" anchor="ctr" anchorCtr="0" forceAA="0" compatLnSpc="1">
+            <a:prstTxWarp prst="textNoShape">
               <a:avLst/>
-            </a:prstGeom>
-            <a:noFill/>
-            <a:ln>
-              <a:solidFill>
-                <a:schemeClr val="tx1"/>
-              </a:solidFill>
-            </a:ln>
-          </p:spPr>
-          <p:style>
-            <a:lnRef idx="2">
-              <a:schemeClr val="accent1">
-                <a:shade val="50000"/>
-              </a:schemeClr>
-            </a:lnRef>
-            <a:fillRef idx="1">
-              <a:schemeClr val="accent1"/>
-            </a:fillRef>
-            <a:effectRef idx="0">
-              <a:schemeClr val="accent1"/>
-            </a:effectRef>
-            <a:fontRef idx="minor">
-              <a:schemeClr val="lt1"/>
-            </a:fontRef>
-          </p:style>
-          <p:txBody>
-            <a:bodyPr rtlCol="0" anchor="ctr"/>
-            <a:lstStyle/>
-            <a:p>
-              <a:pPr algn="ctr"/>
-              <a:endParaRPr lang="zh-CN" altLang="en-US"/>
-            </a:p>
-          </p:txBody>
-        </p:sp>
-        <p:sp>
-          <p:nvSpPr>
-            <p:cNvPr id="10" name="矩形 9"/>
-            <p:cNvSpPr/>
-            <p:nvPr/>
-          </p:nvSpPr>
-          <p:spPr>
-            <a:xfrm>
-              <a:off x="2295059" y="236534"/>
-              <a:ext cx="45719" cy="45719"/>
-            </a:xfrm>
-            <a:prstGeom prst="rect">
+            </a:prstTxWarp>
+            <a:noAutofit/>
+          </a:bodyPr>
+          <a:lstStyle>
+            <a:defPPr>
+              <a:defRPr lang="zh-CN"/>
+            </a:defPPr>
+            <a:lvl1pPr marL="0" algn="l" defTabSz="207294" rtl="0" eaLnBrk="1" latinLnBrk="0" hangingPunct="1">
+              <a:defRPr sz="408" kern="1200">
+                <a:solidFill>
+                  <a:schemeClr val="lt1"/>
+                </a:solidFill>
+                <a:latin typeface="+mn-lt"/>
+                <a:ea typeface="+mn-ea"/>
+                <a:cs typeface="+mn-cs"/>
+              </a:defRPr>
+            </a:lvl1pPr>
+            <a:lvl2pPr marL="103647" algn="l" defTabSz="207294" rtl="0" eaLnBrk="1" latinLnBrk="0" hangingPunct="1">
+              <a:defRPr sz="408" kern="1200">
+                <a:solidFill>
+                  <a:schemeClr val="lt1"/>
+                </a:solidFill>
+                <a:latin typeface="+mn-lt"/>
+                <a:ea typeface="+mn-ea"/>
+                <a:cs typeface="+mn-cs"/>
+              </a:defRPr>
+            </a:lvl2pPr>
+            <a:lvl3pPr marL="207294" algn="l" defTabSz="207294" rtl="0" eaLnBrk="1" latinLnBrk="0" hangingPunct="1">
+              <a:defRPr sz="408" kern="1200">
+                <a:solidFill>
+                  <a:schemeClr val="lt1"/>
+                </a:solidFill>
+                <a:latin typeface="+mn-lt"/>
+                <a:ea typeface="+mn-ea"/>
+                <a:cs typeface="+mn-cs"/>
+              </a:defRPr>
+            </a:lvl3pPr>
+            <a:lvl4pPr marL="310942" algn="l" defTabSz="207294" rtl="0" eaLnBrk="1" latinLnBrk="0" hangingPunct="1">
+              <a:defRPr sz="408" kern="1200">
+                <a:solidFill>
+                  <a:schemeClr val="lt1"/>
+                </a:solidFill>
+                <a:latin typeface="+mn-lt"/>
+                <a:ea typeface="+mn-ea"/>
+                <a:cs typeface="+mn-cs"/>
+              </a:defRPr>
+            </a:lvl4pPr>
+            <a:lvl5pPr marL="414589" algn="l" defTabSz="207294" rtl="0" eaLnBrk="1" latinLnBrk="0" hangingPunct="1">
+              <a:defRPr sz="408" kern="1200">
+                <a:solidFill>
+                  <a:schemeClr val="lt1"/>
+                </a:solidFill>
+                <a:latin typeface="+mn-lt"/>
+                <a:ea typeface="+mn-ea"/>
+                <a:cs typeface="+mn-cs"/>
+              </a:defRPr>
+            </a:lvl5pPr>
+            <a:lvl6pPr marL="518236" algn="l" defTabSz="207294" rtl="0" eaLnBrk="1" latinLnBrk="0" hangingPunct="1">
+              <a:defRPr sz="408" kern="1200">
+                <a:solidFill>
+                  <a:schemeClr val="lt1"/>
+                </a:solidFill>
+                <a:latin typeface="+mn-lt"/>
+                <a:ea typeface="+mn-ea"/>
+                <a:cs typeface="+mn-cs"/>
+              </a:defRPr>
+            </a:lvl6pPr>
+            <a:lvl7pPr marL="621883" algn="l" defTabSz="207294" rtl="0" eaLnBrk="1" latinLnBrk="0" hangingPunct="1">
+              <a:defRPr sz="408" kern="1200">
+                <a:solidFill>
+                  <a:schemeClr val="lt1"/>
+                </a:solidFill>
+                <a:latin typeface="+mn-lt"/>
+                <a:ea typeface="+mn-ea"/>
+                <a:cs typeface="+mn-cs"/>
+              </a:defRPr>
+            </a:lvl7pPr>
+            <a:lvl8pPr marL="725531" algn="l" defTabSz="207294" rtl="0" eaLnBrk="1" latinLnBrk="0" hangingPunct="1">
+              <a:defRPr sz="408" kern="1200">
+                <a:solidFill>
+                  <a:schemeClr val="lt1"/>
+                </a:solidFill>
+                <a:latin typeface="+mn-lt"/>
+                <a:ea typeface="+mn-ea"/>
+                <a:cs typeface="+mn-cs"/>
+              </a:defRPr>
+            </a:lvl8pPr>
+            <a:lvl9pPr marL="829178" algn="l" defTabSz="207294" rtl="0" eaLnBrk="1" latinLnBrk="0" hangingPunct="1">
+              <a:defRPr sz="408" kern="1200">
+                <a:solidFill>
+                  <a:schemeClr val="lt1"/>
+                </a:solidFill>
+                <a:latin typeface="+mn-lt"/>
+                <a:ea typeface="+mn-ea"/>
+                <a:cs typeface="+mn-cs"/>
+              </a:defRPr>
+            </a:lvl9pPr>
+          </a:lstStyle>
+          <a:p>
+            <a:pPr algn="ctr"/>
+            <a:endParaRPr lang="zh-CN" altLang="en-US"/>
+          </a:p>
+        </p:txBody>
+      </p:sp>
+      <p:sp>
+        <p:nvSpPr>
+          <p:cNvPr id="12" name="矩形 11"/>
+          <p:cNvSpPr/>
+          <p:nvPr/>
+        </p:nvSpPr>
+        <p:spPr>
+          <a:xfrm>
+            <a:off x="1998292" y="654306"/>
+            <a:ext cx="21600" cy="21600"/>
+          </a:xfrm>
+          <a:prstGeom prst="rect">
+            <a:avLst/>
+          </a:prstGeom>
+          <a:solidFill>
+            <a:schemeClr val="bg1">
+              <a:lumMod val="50000"/>
+            </a:schemeClr>
+          </a:solidFill>
+          <a:ln>
+            <a:solidFill>
+              <a:schemeClr val="tx1"/>
+            </a:solidFill>
+          </a:ln>
+        </p:spPr>
+        <p:style>
+          <a:lnRef idx="2">
+            <a:schemeClr val="accent1">
+              <a:shade val="50000"/>
+            </a:schemeClr>
+          </a:lnRef>
+          <a:fillRef idx="1">
+            <a:schemeClr val="accent1"/>
+          </a:fillRef>
+          <a:effectRef idx="0">
+            <a:schemeClr val="accent1"/>
+          </a:effectRef>
+          <a:fontRef idx="minor">
+            <a:schemeClr val="lt1"/>
+          </a:fontRef>
+        </p:style>
+        <p:txBody>
+          <a:bodyPr rot="0" spcFirstLastPara="0" vert="horz" wrap="square" lIns="91440" tIns="45720" rIns="91440" bIns="45720" numCol="1" spcCol="0" rtlCol="0" fromWordArt="0" anchor="ctr" anchorCtr="0" forceAA="0" compatLnSpc="1">
+            <a:prstTxWarp prst="textNoShape">
               <a:avLst/>
-            </a:prstGeom>
-            <a:noFill/>
-            <a:ln>
-              <a:solidFill>
-                <a:schemeClr val="tx1"/>
-              </a:solidFill>
-            </a:ln>
-          </p:spPr>
-          <p:style>
-            <a:lnRef idx="2">
-              <a:schemeClr val="accent1">
-                <a:shade val="50000"/>
-              </a:schemeClr>
-            </a:lnRef>
-            <a:fillRef idx="1">
-              <a:schemeClr val="accent1"/>
-            </a:fillRef>
-            <a:effectRef idx="0">
-              <a:schemeClr val="accent1"/>
-            </a:effectRef>
-            <a:fontRef idx="minor">
-              <a:schemeClr val="lt1"/>
-            </a:fontRef>
-          </p:style>
-          <p:txBody>
-            <a:bodyPr rtlCol="0" anchor="ctr"/>
-            <a:lstStyle/>
-            <a:p>
-              <a:pPr algn="ctr"/>
-              <a:endParaRPr lang="zh-CN" altLang="en-US"/>
-            </a:p>
-          </p:txBody>
-        </p:sp>
-        <p:sp>
-          <p:nvSpPr>
-            <p:cNvPr id="11" name="矩形 10"/>
-            <p:cNvSpPr/>
-            <p:nvPr/>
-          </p:nvSpPr>
-          <p:spPr>
-            <a:xfrm>
-              <a:off x="2100528" y="445592"/>
-              <a:ext cx="45719" cy="45719"/>
-            </a:xfrm>
-            <a:prstGeom prst="rect">
+            </a:prstTxWarp>
+            <a:noAutofit/>
+          </a:bodyPr>
+          <a:lstStyle>
+            <a:defPPr>
+              <a:defRPr lang="zh-CN"/>
+            </a:defPPr>
+            <a:lvl1pPr marL="0" algn="l" defTabSz="207294" rtl="0" eaLnBrk="1" latinLnBrk="0" hangingPunct="1">
+              <a:defRPr sz="408" kern="1200">
+                <a:solidFill>
+                  <a:schemeClr val="lt1"/>
+                </a:solidFill>
+                <a:latin typeface="+mn-lt"/>
+                <a:ea typeface="+mn-ea"/>
+                <a:cs typeface="+mn-cs"/>
+              </a:defRPr>
+            </a:lvl1pPr>
+            <a:lvl2pPr marL="103647" algn="l" defTabSz="207294" rtl="0" eaLnBrk="1" latinLnBrk="0" hangingPunct="1">
+              <a:defRPr sz="408" kern="1200">
+                <a:solidFill>
+                  <a:schemeClr val="lt1"/>
+                </a:solidFill>
+                <a:latin typeface="+mn-lt"/>
+                <a:ea typeface="+mn-ea"/>
+                <a:cs typeface="+mn-cs"/>
+              </a:defRPr>
+            </a:lvl2pPr>
+            <a:lvl3pPr marL="207294" algn="l" defTabSz="207294" rtl="0" eaLnBrk="1" latinLnBrk="0" hangingPunct="1">
+              <a:defRPr sz="408" kern="1200">
+                <a:solidFill>
+                  <a:schemeClr val="lt1"/>
+                </a:solidFill>
+                <a:latin typeface="+mn-lt"/>
+                <a:ea typeface="+mn-ea"/>
+                <a:cs typeface="+mn-cs"/>
+              </a:defRPr>
+            </a:lvl3pPr>
+            <a:lvl4pPr marL="310942" algn="l" defTabSz="207294" rtl="0" eaLnBrk="1" latinLnBrk="0" hangingPunct="1">
+              <a:defRPr sz="408" kern="1200">
+                <a:solidFill>
+                  <a:schemeClr val="lt1"/>
+                </a:solidFill>
+                <a:latin typeface="+mn-lt"/>
+                <a:ea typeface="+mn-ea"/>
+                <a:cs typeface="+mn-cs"/>
+              </a:defRPr>
+            </a:lvl4pPr>
+            <a:lvl5pPr marL="414589" algn="l" defTabSz="207294" rtl="0" eaLnBrk="1" latinLnBrk="0" hangingPunct="1">
+              <a:defRPr sz="408" kern="1200">
+                <a:solidFill>
+                  <a:schemeClr val="lt1"/>
+                </a:solidFill>
+                <a:latin typeface="+mn-lt"/>
+                <a:ea typeface="+mn-ea"/>
+                <a:cs typeface="+mn-cs"/>
+              </a:defRPr>
+            </a:lvl5pPr>
+            <a:lvl6pPr marL="518236" algn="l" defTabSz="207294" rtl="0" eaLnBrk="1" latinLnBrk="0" hangingPunct="1">
+              <a:defRPr sz="408" kern="1200">
+                <a:solidFill>
+                  <a:schemeClr val="lt1"/>
+                </a:solidFill>
+                <a:latin typeface="+mn-lt"/>
+                <a:ea typeface="+mn-ea"/>
+                <a:cs typeface="+mn-cs"/>
+              </a:defRPr>
+            </a:lvl6pPr>
+            <a:lvl7pPr marL="621883" algn="l" defTabSz="207294" rtl="0" eaLnBrk="1" latinLnBrk="0" hangingPunct="1">
+              <a:defRPr sz="408" kern="1200">
+                <a:solidFill>
+                  <a:schemeClr val="lt1"/>
+                </a:solidFill>
+                <a:latin typeface="+mn-lt"/>
+                <a:ea typeface="+mn-ea"/>
+                <a:cs typeface="+mn-cs"/>
+              </a:defRPr>
+            </a:lvl7pPr>
+            <a:lvl8pPr marL="725531" algn="l" defTabSz="207294" rtl="0" eaLnBrk="1" latinLnBrk="0" hangingPunct="1">
+              <a:defRPr sz="408" kern="1200">
+                <a:solidFill>
+                  <a:schemeClr val="lt1"/>
+                </a:solidFill>
+                <a:latin typeface="+mn-lt"/>
+                <a:ea typeface="+mn-ea"/>
+                <a:cs typeface="+mn-cs"/>
+              </a:defRPr>
+            </a:lvl8pPr>
+            <a:lvl9pPr marL="829178" algn="l" defTabSz="207294" rtl="0" eaLnBrk="1" latinLnBrk="0" hangingPunct="1">
+              <a:defRPr sz="408" kern="1200">
+                <a:solidFill>
+                  <a:schemeClr val="lt1"/>
+                </a:solidFill>
+                <a:latin typeface="+mn-lt"/>
+                <a:ea typeface="+mn-ea"/>
+                <a:cs typeface="+mn-cs"/>
+              </a:defRPr>
+            </a:lvl9pPr>
+          </a:lstStyle>
+          <a:p>
+            <a:pPr algn="ctr"/>
+            <a:endParaRPr lang="zh-CN" altLang="en-US"/>
+          </a:p>
+        </p:txBody>
+      </p:sp>
+      <p:sp>
+        <p:nvSpPr>
+          <p:cNvPr id="13" name="矩形 12"/>
+          <p:cNvSpPr/>
+          <p:nvPr/>
+        </p:nvSpPr>
+        <p:spPr>
+          <a:xfrm>
+            <a:off x="1822703" y="840889"/>
+            <a:ext cx="21600" cy="21600"/>
+          </a:xfrm>
+          <a:prstGeom prst="rect">
+            <a:avLst/>
+          </a:prstGeom>
+          <a:solidFill>
+            <a:schemeClr val="bg1">
+              <a:lumMod val="50000"/>
+            </a:schemeClr>
+          </a:solidFill>
+          <a:ln>
+            <a:solidFill>
+              <a:schemeClr val="tx1"/>
+            </a:solidFill>
+          </a:ln>
+        </p:spPr>
+        <p:style>
+          <a:lnRef idx="2">
+            <a:schemeClr val="accent1">
+              <a:shade val="50000"/>
+            </a:schemeClr>
+          </a:lnRef>
+          <a:fillRef idx="1">
+            <a:schemeClr val="accent1"/>
+          </a:fillRef>
+          <a:effectRef idx="0">
+            <a:schemeClr val="accent1"/>
+          </a:effectRef>
+          <a:fontRef idx="minor">
+            <a:schemeClr val="lt1"/>
+          </a:fontRef>
+        </p:style>
+        <p:txBody>
+          <a:bodyPr rot="0" spcFirstLastPara="0" vert="horz" wrap="square" lIns="91440" tIns="45720" rIns="91440" bIns="45720" numCol="1" spcCol="0" rtlCol="0" fromWordArt="0" anchor="ctr" anchorCtr="0" forceAA="0" compatLnSpc="1">
+            <a:prstTxWarp prst="textNoShape">
               <a:avLst/>
-            </a:prstGeom>
-            <a:noFill/>
-            <a:ln>
-              <a:solidFill>
-                <a:schemeClr val="tx1"/>
-              </a:solidFill>
-            </a:ln>
-          </p:spPr>
-          <p:style>
-            <a:lnRef idx="2">
-              <a:schemeClr val="accent1">
-                <a:shade val="50000"/>
-              </a:schemeClr>
-            </a:lnRef>
-            <a:fillRef idx="1">
-              <a:schemeClr val="accent1"/>
-            </a:fillRef>
-            <a:effectRef idx="0">
-              <a:schemeClr val="accent1"/>
-            </a:effectRef>
-            <a:fontRef idx="minor">
-              <a:schemeClr val="lt1"/>
-            </a:fontRef>
-          </p:style>
-          <p:txBody>
-            <a:bodyPr rot="0" spcFirstLastPara="0" vert="horz" wrap="square" lIns="91440" tIns="45720" rIns="91440" bIns="45720" numCol="1" spcCol="0" rtlCol="0" fromWordArt="0" anchor="ctr" anchorCtr="0" forceAA="0" compatLnSpc="1">
-              <a:prstTxWarp prst="textNoShape">
-                <a:avLst/>
-              </a:prstTxWarp>
-              <a:noAutofit/>
-            </a:bodyPr>
-            <a:lstStyle>
-              <a:defPPr>
-                <a:defRPr lang="zh-CN"/>
-              </a:defPPr>
-              <a:lvl1pPr marL="0" algn="l" defTabSz="207294" rtl="0" eaLnBrk="1" latinLnBrk="0" hangingPunct="1">
-                <a:defRPr sz="408" kern="1200">
-                  <a:solidFill>
-                    <a:schemeClr val="lt1"/>
-                  </a:solidFill>
-                  <a:latin typeface="+mn-lt"/>
-                  <a:ea typeface="+mn-ea"/>
-                  <a:cs typeface="+mn-cs"/>
-                </a:defRPr>
-              </a:lvl1pPr>
-              <a:lvl2pPr marL="103647" algn="l" defTabSz="207294" rtl="0" eaLnBrk="1" latinLnBrk="0" hangingPunct="1">
-                <a:defRPr sz="408" kern="1200">
-                  <a:solidFill>
-                    <a:schemeClr val="lt1"/>
-                  </a:solidFill>
-                  <a:latin typeface="+mn-lt"/>
-                  <a:ea typeface="+mn-ea"/>
-                  <a:cs typeface="+mn-cs"/>
-                </a:defRPr>
-              </a:lvl2pPr>
-              <a:lvl3pPr marL="207294" algn="l" defTabSz="207294" rtl="0" eaLnBrk="1" latinLnBrk="0" hangingPunct="1">
-                <a:defRPr sz="408" kern="1200">
-                  <a:solidFill>
-                    <a:schemeClr val="lt1"/>
-                  </a:solidFill>
-                  <a:latin typeface="+mn-lt"/>
-                  <a:ea typeface="+mn-ea"/>
-                  <a:cs typeface="+mn-cs"/>
-                </a:defRPr>
-              </a:lvl3pPr>
-              <a:lvl4pPr marL="310942" algn="l" defTabSz="207294" rtl="0" eaLnBrk="1" latinLnBrk="0" hangingPunct="1">
-                <a:defRPr sz="408" kern="1200">
-                  <a:solidFill>
-                    <a:schemeClr val="lt1"/>
-                  </a:solidFill>
-                  <a:latin typeface="+mn-lt"/>
-                  <a:ea typeface="+mn-ea"/>
-                  <a:cs typeface="+mn-cs"/>
-                </a:defRPr>
-              </a:lvl4pPr>
-              <a:lvl5pPr marL="414589" algn="l" defTabSz="207294" rtl="0" eaLnBrk="1" latinLnBrk="0" hangingPunct="1">
-                <a:defRPr sz="408" kern="1200">
-                  <a:solidFill>
-                    <a:schemeClr val="lt1"/>
-                  </a:solidFill>
-                  <a:latin typeface="+mn-lt"/>
-                  <a:ea typeface="+mn-ea"/>
-                  <a:cs typeface="+mn-cs"/>
-                </a:defRPr>
-              </a:lvl5pPr>
-              <a:lvl6pPr marL="518236" algn="l" defTabSz="207294" rtl="0" eaLnBrk="1" latinLnBrk="0" hangingPunct="1">
-                <a:defRPr sz="408" kern="1200">
-                  <a:solidFill>
-                    <a:schemeClr val="lt1"/>
-                  </a:solidFill>
-                  <a:latin typeface="+mn-lt"/>
-                  <a:ea typeface="+mn-ea"/>
-                  <a:cs typeface="+mn-cs"/>
-                </a:defRPr>
-              </a:lvl6pPr>
-              <a:lvl7pPr marL="621883" algn="l" defTabSz="207294" rtl="0" eaLnBrk="1" latinLnBrk="0" hangingPunct="1">
-                <a:defRPr sz="408" kern="1200">
-                  <a:solidFill>
-                    <a:schemeClr val="lt1"/>
-                  </a:solidFill>
-                  <a:latin typeface="+mn-lt"/>
-                  <a:ea typeface="+mn-ea"/>
-                  <a:cs typeface="+mn-cs"/>
-                </a:defRPr>
-              </a:lvl7pPr>
-              <a:lvl8pPr marL="725531" algn="l" defTabSz="207294" rtl="0" eaLnBrk="1" latinLnBrk="0" hangingPunct="1">
-                <a:defRPr sz="408" kern="1200">
-                  <a:solidFill>
-                    <a:schemeClr val="lt1"/>
-                  </a:solidFill>
-                  <a:latin typeface="+mn-lt"/>
-                  <a:ea typeface="+mn-ea"/>
-                  <a:cs typeface="+mn-cs"/>
-                </a:defRPr>
-              </a:lvl8pPr>
-              <a:lvl9pPr marL="829178" algn="l" defTabSz="207294" rtl="0" eaLnBrk="1" latinLnBrk="0" hangingPunct="1">
-                <a:defRPr sz="408" kern="1200">
-                  <a:solidFill>
-                    <a:schemeClr val="lt1"/>
-                  </a:solidFill>
-                  <a:latin typeface="+mn-lt"/>
-                  <a:ea typeface="+mn-ea"/>
-                  <a:cs typeface="+mn-cs"/>
-                </a:defRPr>
-              </a:lvl9pPr>
-            </a:lstStyle>
-            <a:p>
-              <a:pPr algn="ctr"/>
-              <a:endParaRPr lang="zh-CN" altLang="en-US"/>
-            </a:p>
-          </p:txBody>
-        </p:sp>
-        <p:sp>
-          <p:nvSpPr>
-            <p:cNvPr id="12" name="矩形 11"/>
-            <p:cNvSpPr/>
-            <p:nvPr/>
-          </p:nvSpPr>
-          <p:spPr>
-            <a:xfrm>
-              <a:off x="1998292" y="654307"/>
-              <a:ext cx="45719" cy="45719"/>
-            </a:xfrm>
-            <a:prstGeom prst="rect">
+            </a:prstTxWarp>
+            <a:noAutofit/>
+          </a:bodyPr>
+          <a:lstStyle>
+            <a:defPPr>
+              <a:defRPr lang="zh-CN"/>
+            </a:defPPr>
+            <a:lvl1pPr marL="0" algn="l" defTabSz="207294" rtl="0" eaLnBrk="1" latinLnBrk="0" hangingPunct="1">
+              <a:defRPr sz="408" kern="1200">
+                <a:solidFill>
+                  <a:schemeClr val="lt1"/>
+                </a:solidFill>
+                <a:latin typeface="+mn-lt"/>
+                <a:ea typeface="+mn-ea"/>
+                <a:cs typeface="+mn-cs"/>
+              </a:defRPr>
+            </a:lvl1pPr>
+            <a:lvl2pPr marL="103647" algn="l" defTabSz="207294" rtl="0" eaLnBrk="1" latinLnBrk="0" hangingPunct="1">
+              <a:defRPr sz="408" kern="1200">
+                <a:solidFill>
+                  <a:schemeClr val="lt1"/>
+                </a:solidFill>
+                <a:latin typeface="+mn-lt"/>
+                <a:ea typeface="+mn-ea"/>
+                <a:cs typeface="+mn-cs"/>
+              </a:defRPr>
+            </a:lvl2pPr>
+            <a:lvl3pPr marL="207294" algn="l" defTabSz="207294" rtl="0" eaLnBrk="1" latinLnBrk="0" hangingPunct="1">
+              <a:defRPr sz="408" kern="1200">
+                <a:solidFill>
+                  <a:schemeClr val="lt1"/>
+                </a:solidFill>
+                <a:latin typeface="+mn-lt"/>
+                <a:ea typeface="+mn-ea"/>
+                <a:cs typeface="+mn-cs"/>
+              </a:defRPr>
+            </a:lvl3pPr>
+            <a:lvl4pPr marL="310942" algn="l" defTabSz="207294" rtl="0" eaLnBrk="1" latinLnBrk="0" hangingPunct="1">
+              <a:defRPr sz="408" kern="1200">
+                <a:solidFill>
+                  <a:schemeClr val="lt1"/>
+                </a:solidFill>
+                <a:latin typeface="+mn-lt"/>
+                <a:ea typeface="+mn-ea"/>
+                <a:cs typeface="+mn-cs"/>
+              </a:defRPr>
+            </a:lvl4pPr>
+            <a:lvl5pPr marL="414589" algn="l" defTabSz="207294" rtl="0" eaLnBrk="1" latinLnBrk="0" hangingPunct="1">
+              <a:defRPr sz="408" kern="1200">
+                <a:solidFill>
+                  <a:schemeClr val="lt1"/>
+                </a:solidFill>
+                <a:latin typeface="+mn-lt"/>
+                <a:ea typeface="+mn-ea"/>
+                <a:cs typeface="+mn-cs"/>
+              </a:defRPr>
+            </a:lvl5pPr>
+            <a:lvl6pPr marL="518236" algn="l" defTabSz="207294" rtl="0" eaLnBrk="1" latinLnBrk="0" hangingPunct="1">
+              <a:defRPr sz="408" kern="1200">
+                <a:solidFill>
+                  <a:schemeClr val="lt1"/>
+                </a:solidFill>
+                <a:latin typeface="+mn-lt"/>
+                <a:ea typeface="+mn-ea"/>
+                <a:cs typeface="+mn-cs"/>
+              </a:defRPr>
+            </a:lvl6pPr>
+            <a:lvl7pPr marL="621883" algn="l" defTabSz="207294" rtl="0" eaLnBrk="1" latinLnBrk="0" hangingPunct="1">
+              <a:defRPr sz="408" kern="1200">
+                <a:solidFill>
+                  <a:schemeClr val="lt1"/>
+                </a:solidFill>
+                <a:latin typeface="+mn-lt"/>
+                <a:ea typeface="+mn-ea"/>
+                <a:cs typeface="+mn-cs"/>
+              </a:defRPr>
+            </a:lvl7pPr>
+            <a:lvl8pPr marL="725531" algn="l" defTabSz="207294" rtl="0" eaLnBrk="1" latinLnBrk="0" hangingPunct="1">
+              <a:defRPr sz="408" kern="1200">
+                <a:solidFill>
+                  <a:schemeClr val="lt1"/>
+                </a:solidFill>
+                <a:latin typeface="+mn-lt"/>
+                <a:ea typeface="+mn-ea"/>
+                <a:cs typeface="+mn-cs"/>
+              </a:defRPr>
+            </a:lvl8pPr>
+            <a:lvl9pPr marL="829178" algn="l" defTabSz="207294" rtl="0" eaLnBrk="1" latinLnBrk="0" hangingPunct="1">
+              <a:defRPr sz="408" kern="1200">
+                <a:solidFill>
+                  <a:schemeClr val="lt1"/>
+                </a:solidFill>
+                <a:latin typeface="+mn-lt"/>
+                <a:ea typeface="+mn-ea"/>
+                <a:cs typeface="+mn-cs"/>
+              </a:defRPr>
+            </a:lvl9pPr>
+          </a:lstStyle>
+          <a:p>
+            <a:pPr algn="ctr"/>
+            <a:endParaRPr lang="zh-CN" altLang="en-US"/>
+          </a:p>
+        </p:txBody>
+      </p:sp>
+      <p:sp>
+        <p:nvSpPr>
+          <p:cNvPr id="14" name="矩形 13"/>
+          <p:cNvSpPr/>
+          <p:nvPr/>
+        </p:nvSpPr>
+        <p:spPr>
+          <a:xfrm>
+            <a:off x="2126272" y="911776"/>
+            <a:ext cx="21600" cy="21600"/>
+          </a:xfrm>
+          <a:prstGeom prst="rect">
+            <a:avLst/>
+          </a:prstGeom>
+          <a:solidFill>
+            <a:schemeClr val="bg1">
+              <a:lumMod val="50000"/>
+            </a:schemeClr>
+          </a:solidFill>
+          <a:ln>
+            <a:solidFill>
+              <a:schemeClr val="tx1"/>
+            </a:solidFill>
+          </a:ln>
+        </p:spPr>
+        <p:style>
+          <a:lnRef idx="2">
+            <a:schemeClr val="accent1">
+              <a:shade val="50000"/>
+            </a:schemeClr>
+          </a:lnRef>
+          <a:fillRef idx="1">
+            <a:schemeClr val="accent1"/>
+          </a:fillRef>
+          <a:effectRef idx="0">
+            <a:schemeClr val="accent1"/>
+          </a:effectRef>
+          <a:fontRef idx="minor">
+            <a:schemeClr val="lt1"/>
+          </a:fontRef>
+        </p:style>
+        <p:txBody>
+          <a:bodyPr rot="0" spcFirstLastPara="0" vert="horz" wrap="square" lIns="91440" tIns="45720" rIns="91440" bIns="45720" numCol="1" spcCol="0" rtlCol="0" fromWordArt="0" anchor="ctr" anchorCtr="0" forceAA="0" compatLnSpc="1">
+            <a:prstTxWarp prst="textNoShape">
               <a:avLst/>
-            </a:prstGeom>
-            <a:noFill/>
-            <a:ln>
-              <a:solidFill>
-                <a:schemeClr val="tx1"/>
-              </a:solidFill>
-            </a:ln>
-          </p:spPr>
-          <p:style>
-            <a:lnRef idx="2">
-              <a:schemeClr val="accent1">
-                <a:shade val="50000"/>
-              </a:schemeClr>
-            </a:lnRef>
-            <a:fillRef idx="1">
-              <a:schemeClr val="accent1"/>
-            </a:fillRef>
-            <a:effectRef idx="0">
-              <a:schemeClr val="accent1"/>
-            </a:effectRef>
-            <a:fontRef idx="minor">
-              <a:schemeClr val="lt1"/>
-            </a:fontRef>
-          </p:style>
-          <p:txBody>
-            <a:bodyPr rot="0" spcFirstLastPara="0" vert="horz" wrap="square" lIns="91440" tIns="45720" rIns="91440" bIns="45720" numCol="1" spcCol="0" rtlCol="0" fromWordArt="0" anchor="ctr" anchorCtr="0" forceAA="0" compatLnSpc="1">
-              <a:prstTxWarp prst="textNoShape">
-                <a:avLst/>
-              </a:prstTxWarp>
-              <a:noAutofit/>
-            </a:bodyPr>
-            <a:lstStyle>
-              <a:defPPr>
-                <a:defRPr lang="zh-CN"/>
-              </a:defPPr>
-              <a:lvl1pPr marL="0" algn="l" defTabSz="207294" rtl="0" eaLnBrk="1" latinLnBrk="0" hangingPunct="1">
-                <a:defRPr sz="408" kern="1200">
-                  <a:solidFill>
-                    <a:schemeClr val="lt1"/>
-                  </a:solidFill>
-                  <a:latin typeface="+mn-lt"/>
-                  <a:ea typeface="+mn-ea"/>
-                  <a:cs typeface="+mn-cs"/>
-                </a:defRPr>
-              </a:lvl1pPr>
-              <a:lvl2pPr marL="103647" algn="l" defTabSz="207294" rtl="0" eaLnBrk="1" latinLnBrk="0" hangingPunct="1">
-                <a:defRPr sz="408" kern="1200">
-                  <a:solidFill>
-                    <a:schemeClr val="lt1"/>
-                  </a:solidFill>
-                  <a:latin typeface="+mn-lt"/>
-                  <a:ea typeface="+mn-ea"/>
-                  <a:cs typeface="+mn-cs"/>
-                </a:defRPr>
-              </a:lvl2pPr>
-              <a:lvl3pPr marL="207294" algn="l" defTabSz="207294" rtl="0" eaLnBrk="1" latinLnBrk="0" hangingPunct="1">
-                <a:defRPr sz="408" kern="1200">
-                  <a:solidFill>
-                    <a:schemeClr val="lt1"/>
-                  </a:solidFill>
-                  <a:latin typeface="+mn-lt"/>
-                  <a:ea typeface="+mn-ea"/>
-                  <a:cs typeface="+mn-cs"/>
-                </a:defRPr>
-              </a:lvl3pPr>
-              <a:lvl4pPr marL="310942" algn="l" defTabSz="207294" rtl="0" eaLnBrk="1" latinLnBrk="0" hangingPunct="1">
-                <a:defRPr sz="408" kern="1200">
-                  <a:solidFill>
-                    <a:schemeClr val="lt1"/>
-                  </a:solidFill>
-                  <a:latin typeface="+mn-lt"/>
-                  <a:ea typeface="+mn-ea"/>
-                  <a:cs typeface="+mn-cs"/>
-                </a:defRPr>
-              </a:lvl4pPr>
-              <a:lvl5pPr marL="414589" algn="l" defTabSz="207294" rtl="0" eaLnBrk="1" latinLnBrk="0" hangingPunct="1">
-                <a:defRPr sz="408" kern="1200">
-                  <a:solidFill>
-                    <a:schemeClr val="lt1"/>
-                  </a:solidFill>
-                  <a:latin typeface="+mn-lt"/>
-                  <a:ea typeface="+mn-ea"/>
-                  <a:cs typeface="+mn-cs"/>
-                </a:defRPr>
-              </a:lvl5pPr>
-              <a:lvl6pPr marL="518236" algn="l" defTabSz="207294" rtl="0" eaLnBrk="1" latinLnBrk="0" hangingPunct="1">
-                <a:defRPr sz="408" kern="1200">
-                  <a:solidFill>
-                    <a:schemeClr val="lt1"/>
-                  </a:solidFill>
-                  <a:latin typeface="+mn-lt"/>
-                  <a:ea typeface="+mn-ea"/>
-                  <a:cs typeface="+mn-cs"/>
-                </a:defRPr>
-              </a:lvl6pPr>
-              <a:lvl7pPr marL="621883" algn="l" defTabSz="207294" rtl="0" eaLnBrk="1" latinLnBrk="0" hangingPunct="1">
-                <a:defRPr sz="408" kern="1200">
-                  <a:solidFill>
-                    <a:schemeClr val="lt1"/>
-                  </a:solidFill>
-                  <a:latin typeface="+mn-lt"/>
-                  <a:ea typeface="+mn-ea"/>
-                  <a:cs typeface="+mn-cs"/>
-                </a:defRPr>
-              </a:lvl7pPr>
-              <a:lvl8pPr marL="725531" algn="l" defTabSz="207294" rtl="0" eaLnBrk="1" latinLnBrk="0" hangingPunct="1">
-                <a:defRPr sz="408" kern="1200">
-                  <a:solidFill>
-                    <a:schemeClr val="lt1"/>
-                  </a:solidFill>
-                  <a:latin typeface="+mn-lt"/>
-                  <a:ea typeface="+mn-ea"/>
-                  <a:cs typeface="+mn-cs"/>
-                </a:defRPr>
-              </a:lvl8pPr>
-              <a:lvl9pPr marL="829178" algn="l" defTabSz="207294" rtl="0" eaLnBrk="1" latinLnBrk="0" hangingPunct="1">
-                <a:defRPr sz="408" kern="1200">
-                  <a:solidFill>
-                    <a:schemeClr val="lt1"/>
-                  </a:solidFill>
-                  <a:latin typeface="+mn-lt"/>
-                  <a:ea typeface="+mn-ea"/>
-                  <a:cs typeface="+mn-cs"/>
-                </a:defRPr>
-              </a:lvl9pPr>
-            </a:lstStyle>
-            <a:p>
-              <a:pPr algn="ctr"/>
-              <a:endParaRPr lang="zh-CN" altLang="en-US"/>
-            </a:p>
-          </p:txBody>
-        </p:sp>
-        <p:sp>
-          <p:nvSpPr>
-            <p:cNvPr id="13" name="矩形 12"/>
-            <p:cNvSpPr/>
-            <p:nvPr/>
-          </p:nvSpPr>
-          <p:spPr>
-            <a:xfrm>
-              <a:off x="1822703" y="840890"/>
-              <a:ext cx="45719" cy="45719"/>
-            </a:xfrm>
-            <a:prstGeom prst="rect">
+            </a:prstTxWarp>
+            <a:noAutofit/>
+          </a:bodyPr>
+          <a:lstStyle>
+            <a:defPPr>
+              <a:defRPr lang="zh-CN"/>
+            </a:defPPr>
+            <a:lvl1pPr marL="0" algn="l" defTabSz="207294" rtl="0" eaLnBrk="1" latinLnBrk="0" hangingPunct="1">
+              <a:defRPr sz="408" kern="1200">
+                <a:solidFill>
+                  <a:schemeClr val="lt1"/>
+                </a:solidFill>
+                <a:latin typeface="+mn-lt"/>
+                <a:ea typeface="+mn-ea"/>
+                <a:cs typeface="+mn-cs"/>
+              </a:defRPr>
+            </a:lvl1pPr>
+            <a:lvl2pPr marL="103647" algn="l" defTabSz="207294" rtl="0" eaLnBrk="1" latinLnBrk="0" hangingPunct="1">
+              <a:defRPr sz="408" kern="1200">
+                <a:solidFill>
+                  <a:schemeClr val="lt1"/>
+                </a:solidFill>
+                <a:latin typeface="+mn-lt"/>
+                <a:ea typeface="+mn-ea"/>
+                <a:cs typeface="+mn-cs"/>
+              </a:defRPr>
+            </a:lvl2pPr>
+            <a:lvl3pPr marL="207294" algn="l" defTabSz="207294" rtl="0" eaLnBrk="1" latinLnBrk="0" hangingPunct="1">
+              <a:defRPr sz="408" kern="1200">
+                <a:solidFill>
+                  <a:schemeClr val="lt1"/>
+                </a:solidFill>
+                <a:latin typeface="+mn-lt"/>
+                <a:ea typeface="+mn-ea"/>
+                <a:cs typeface="+mn-cs"/>
+              </a:defRPr>
+            </a:lvl3pPr>
+            <a:lvl4pPr marL="310942" algn="l" defTabSz="207294" rtl="0" eaLnBrk="1" latinLnBrk="0" hangingPunct="1">
+              <a:defRPr sz="408" kern="1200">
+                <a:solidFill>
+                  <a:schemeClr val="lt1"/>
+                </a:solidFill>
+                <a:latin typeface="+mn-lt"/>
+                <a:ea typeface="+mn-ea"/>
+                <a:cs typeface="+mn-cs"/>
+              </a:defRPr>
+            </a:lvl4pPr>
+            <a:lvl5pPr marL="414589" algn="l" defTabSz="207294" rtl="0" eaLnBrk="1" latinLnBrk="0" hangingPunct="1">
+              <a:defRPr sz="408" kern="1200">
+                <a:solidFill>
+                  <a:schemeClr val="lt1"/>
+                </a:solidFill>
+                <a:latin typeface="+mn-lt"/>
+                <a:ea typeface="+mn-ea"/>
+                <a:cs typeface="+mn-cs"/>
+              </a:defRPr>
+            </a:lvl5pPr>
+            <a:lvl6pPr marL="518236" algn="l" defTabSz="207294" rtl="0" eaLnBrk="1" latinLnBrk="0" hangingPunct="1">
+              <a:defRPr sz="408" kern="1200">
+                <a:solidFill>
+                  <a:schemeClr val="lt1"/>
+                </a:solidFill>
+                <a:latin typeface="+mn-lt"/>
+                <a:ea typeface="+mn-ea"/>
+                <a:cs typeface="+mn-cs"/>
+              </a:defRPr>
+            </a:lvl6pPr>
+            <a:lvl7pPr marL="621883" algn="l" defTabSz="207294" rtl="0" eaLnBrk="1" latinLnBrk="0" hangingPunct="1">
+              <a:defRPr sz="408" kern="1200">
+                <a:solidFill>
+                  <a:schemeClr val="lt1"/>
+                </a:solidFill>
+                <a:latin typeface="+mn-lt"/>
+                <a:ea typeface="+mn-ea"/>
+                <a:cs typeface="+mn-cs"/>
+              </a:defRPr>
+            </a:lvl7pPr>
+            <a:lvl8pPr marL="725531" algn="l" defTabSz="207294" rtl="0" eaLnBrk="1" latinLnBrk="0" hangingPunct="1">
+              <a:defRPr sz="408" kern="1200">
+                <a:solidFill>
+                  <a:schemeClr val="lt1"/>
+                </a:solidFill>
+                <a:latin typeface="+mn-lt"/>
+                <a:ea typeface="+mn-ea"/>
+                <a:cs typeface="+mn-cs"/>
+              </a:defRPr>
+            </a:lvl8pPr>
+            <a:lvl9pPr marL="829178" algn="l" defTabSz="207294" rtl="0" eaLnBrk="1" latinLnBrk="0" hangingPunct="1">
+              <a:defRPr sz="408" kern="1200">
+                <a:solidFill>
+                  <a:schemeClr val="lt1"/>
+                </a:solidFill>
+                <a:latin typeface="+mn-lt"/>
+                <a:ea typeface="+mn-ea"/>
+                <a:cs typeface="+mn-cs"/>
+              </a:defRPr>
+            </a:lvl9pPr>
+          </a:lstStyle>
+          <a:p>
+            <a:pPr algn="ctr"/>
+            <a:endParaRPr lang="zh-CN" altLang="en-US"/>
+          </a:p>
+        </p:txBody>
+      </p:sp>
+      <p:sp>
+        <p:nvSpPr>
+          <p:cNvPr id="15" name="矩形 14"/>
+          <p:cNvSpPr/>
+          <p:nvPr/>
+        </p:nvSpPr>
+        <p:spPr>
+          <a:xfrm>
+            <a:off x="2365865" y="904768"/>
+            <a:ext cx="21600" cy="21600"/>
+          </a:xfrm>
+          <a:prstGeom prst="rect">
+            <a:avLst/>
+          </a:prstGeom>
+          <a:solidFill>
+            <a:schemeClr val="bg1">
+              <a:lumMod val="50000"/>
+            </a:schemeClr>
+          </a:solidFill>
+          <a:ln>
+            <a:solidFill>
+              <a:schemeClr val="tx1"/>
+            </a:solidFill>
+          </a:ln>
+        </p:spPr>
+        <p:style>
+          <a:lnRef idx="2">
+            <a:schemeClr val="accent1">
+              <a:shade val="50000"/>
+            </a:schemeClr>
+          </a:lnRef>
+          <a:fillRef idx="1">
+            <a:schemeClr val="accent1"/>
+          </a:fillRef>
+          <a:effectRef idx="0">
+            <a:schemeClr val="accent1"/>
+          </a:effectRef>
+          <a:fontRef idx="minor">
+            <a:schemeClr val="lt1"/>
+          </a:fontRef>
+        </p:style>
+        <p:txBody>
+          <a:bodyPr rot="0" spcFirstLastPara="0" vert="horz" wrap="square" lIns="91440" tIns="45720" rIns="91440" bIns="45720" numCol="1" spcCol="0" rtlCol="0" fromWordArt="0" anchor="ctr" anchorCtr="0" forceAA="0" compatLnSpc="1">
+            <a:prstTxWarp prst="textNoShape">
               <a:avLst/>
-            </a:prstGeom>
-            <a:noFill/>
-            <a:ln>
-              <a:solidFill>
-                <a:schemeClr val="tx1"/>
-              </a:solidFill>
-            </a:ln>
-          </p:spPr>
-          <p:style>
-            <a:lnRef idx="2">
-              <a:schemeClr val="accent1">
-                <a:shade val="50000"/>
-              </a:schemeClr>
-            </a:lnRef>
-            <a:fillRef idx="1">
-              <a:schemeClr val="accent1"/>
-            </a:fillRef>
-            <a:effectRef idx="0">
-              <a:schemeClr val="accent1"/>
-            </a:effectRef>
-            <a:fontRef idx="minor">
-              <a:schemeClr val="lt1"/>
-            </a:fontRef>
-          </p:style>
-          <p:txBody>
-            <a:bodyPr rot="0" spcFirstLastPara="0" vert="horz" wrap="square" lIns="91440" tIns="45720" rIns="91440" bIns="45720" numCol="1" spcCol="0" rtlCol="0" fromWordArt="0" anchor="ctr" anchorCtr="0" forceAA="0" compatLnSpc="1">
-              <a:prstTxWarp prst="textNoShape">
-                <a:avLst/>
-              </a:prstTxWarp>
-              <a:noAutofit/>
-            </a:bodyPr>
-            <a:lstStyle>
-              <a:defPPr>
-                <a:defRPr lang="zh-CN"/>
-              </a:defPPr>
-              <a:lvl1pPr marL="0" algn="l" defTabSz="207294" rtl="0" eaLnBrk="1" latinLnBrk="0" hangingPunct="1">
-                <a:defRPr sz="408" kern="1200">
-                  <a:solidFill>
-                    <a:schemeClr val="lt1"/>
-                  </a:solidFill>
-                  <a:latin typeface="+mn-lt"/>
-                  <a:ea typeface="+mn-ea"/>
-                  <a:cs typeface="+mn-cs"/>
-                </a:defRPr>
-              </a:lvl1pPr>
-              <a:lvl2pPr marL="103647" algn="l" defTabSz="207294" rtl="0" eaLnBrk="1" latinLnBrk="0" hangingPunct="1">
-                <a:defRPr sz="408" kern="1200">
-                  <a:solidFill>
-                    <a:schemeClr val="lt1"/>
-                  </a:solidFill>
-                  <a:latin typeface="+mn-lt"/>
-                  <a:ea typeface="+mn-ea"/>
-                  <a:cs typeface="+mn-cs"/>
-                </a:defRPr>
-              </a:lvl2pPr>
-              <a:lvl3pPr marL="207294" algn="l" defTabSz="207294" rtl="0" eaLnBrk="1" latinLnBrk="0" hangingPunct="1">
-                <a:defRPr sz="408" kern="1200">
-                  <a:solidFill>
-                    <a:schemeClr val="lt1"/>
-                  </a:solidFill>
-                  <a:latin typeface="+mn-lt"/>
-                  <a:ea typeface="+mn-ea"/>
-                  <a:cs typeface="+mn-cs"/>
-                </a:defRPr>
-              </a:lvl3pPr>
-              <a:lvl4pPr marL="310942" algn="l" defTabSz="207294" rtl="0" eaLnBrk="1" latinLnBrk="0" hangingPunct="1">
-                <a:defRPr sz="408" kern="1200">
-                  <a:solidFill>
-                    <a:schemeClr val="lt1"/>
-                  </a:solidFill>
-                  <a:latin typeface="+mn-lt"/>
-                  <a:ea typeface="+mn-ea"/>
-                  <a:cs typeface="+mn-cs"/>
-                </a:defRPr>
-              </a:lvl4pPr>
-              <a:lvl5pPr marL="414589" algn="l" defTabSz="207294" rtl="0" eaLnBrk="1" latinLnBrk="0" hangingPunct="1">
-                <a:defRPr sz="408" kern="1200">
-                  <a:solidFill>
-                    <a:schemeClr val="lt1"/>
-                  </a:solidFill>
-                  <a:latin typeface="+mn-lt"/>
-                  <a:ea typeface="+mn-ea"/>
-                  <a:cs typeface="+mn-cs"/>
-                </a:defRPr>
-              </a:lvl5pPr>
-              <a:lvl6pPr marL="518236" algn="l" defTabSz="207294" rtl="0" eaLnBrk="1" latinLnBrk="0" hangingPunct="1">
-                <a:defRPr sz="408" kern="1200">
-                  <a:solidFill>
-                    <a:schemeClr val="lt1"/>
-                  </a:solidFill>
-                  <a:latin typeface="+mn-lt"/>
-                  <a:ea typeface="+mn-ea"/>
-                  <a:cs typeface="+mn-cs"/>
-                </a:defRPr>
-              </a:lvl6pPr>
-              <a:lvl7pPr marL="621883" algn="l" defTabSz="207294" rtl="0" eaLnBrk="1" latinLnBrk="0" hangingPunct="1">
-                <a:defRPr sz="408" kern="1200">
-                  <a:solidFill>
-                    <a:schemeClr val="lt1"/>
-                  </a:solidFill>
-                  <a:latin typeface="+mn-lt"/>
-                  <a:ea typeface="+mn-ea"/>
-                  <a:cs typeface="+mn-cs"/>
-                </a:defRPr>
-              </a:lvl7pPr>
-              <a:lvl8pPr marL="725531" algn="l" defTabSz="207294" rtl="0" eaLnBrk="1" latinLnBrk="0" hangingPunct="1">
-                <a:defRPr sz="408" kern="1200">
-                  <a:solidFill>
-                    <a:schemeClr val="lt1"/>
-                  </a:solidFill>
-                  <a:latin typeface="+mn-lt"/>
-                  <a:ea typeface="+mn-ea"/>
-                  <a:cs typeface="+mn-cs"/>
-                </a:defRPr>
-              </a:lvl8pPr>
-              <a:lvl9pPr marL="829178" algn="l" defTabSz="207294" rtl="0" eaLnBrk="1" latinLnBrk="0" hangingPunct="1">
-                <a:defRPr sz="408" kern="1200">
-                  <a:solidFill>
-                    <a:schemeClr val="lt1"/>
-                  </a:solidFill>
-                  <a:latin typeface="+mn-lt"/>
-                  <a:ea typeface="+mn-ea"/>
-                  <a:cs typeface="+mn-cs"/>
-                </a:defRPr>
-              </a:lvl9pPr>
-            </a:lstStyle>
-            <a:p>
-              <a:pPr algn="ctr"/>
-              <a:endParaRPr lang="zh-CN" altLang="en-US"/>
-            </a:p>
-          </p:txBody>
-        </p:sp>
-        <p:sp>
-          <p:nvSpPr>
-            <p:cNvPr id="14" name="矩形 13"/>
-            <p:cNvSpPr/>
-            <p:nvPr/>
-          </p:nvSpPr>
-          <p:spPr>
-            <a:xfrm>
-              <a:off x="2126272" y="911777"/>
-              <a:ext cx="45719" cy="45719"/>
-            </a:xfrm>
-            <a:prstGeom prst="rect">
+            </a:prstTxWarp>
+            <a:noAutofit/>
+          </a:bodyPr>
+          <a:lstStyle>
+            <a:defPPr>
+              <a:defRPr lang="zh-CN"/>
+            </a:defPPr>
+            <a:lvl1pPr marL="0" algn="l" defTabSz="207294" rtl="0" eaLnBrk="1" latinLnBrk="0" hangingPunct="1">
+              <a:defRPr sz="408" kern="1200">
+                <a:solidFill>
+                  <a:schemeClr val="lt1"/>
+                </a:solidFill>
+                <a:latin typeface="+mn-lt"/>
+                <a:ea typeface="+mn-ea"/>
+                <a:cs typeface="+mn-cs"/>
+              </a:defRPr>
+            </a:lvl1pPr>
+            <a:lvl2pPr marL="103647" algn="l" defTabSz="207294" rtl="0" eaLnBrk="1" latinLnBrk="0" hangingPunct="1">
+              <a:defRPr sz="408" kern="1200">
+                <a:solidFill>
+                  <a:schemeClr val="lt1"/>
+                </a:solidFill>
+                <a:latin typeface="+mn-lt"/>
+                <a:ea typeface="+mn-ea"/>
+                <a:cs typeface="+mn-cs"/>
+              </a:defRPr>
+            </a:lvl2pPr>
+            <a:lvl3pPr marL="207294" algn="l" defTabSz="207294" rtl="0" eaLnBrk="1" latinLnBrk="0" hangingPunct="1">
+              <a:defRPr sz="408" kern="1200">
+                <a:solidFill>
+                  <a:schemeClr val="lt1"/>
+                </a:solidFill>
+                <a:latin typeface="+mn-lt"/>
+                <a:ea typeface="+mn-ea"/>
+                <a:cs typeface="+mn-cs"/>
+              </a:defRPr>
+            </a:lvl3pPr>
+            <a:lvl4pPr marL="310942" algn="l" defTabSz="207294" rtl="0" eaLnBrk="1" latinLnBrk="0" hangingPunct="1">
+              <a:defRPr sz="408" kern="1200">
+                <a:solidFill>
+                  <a:schemeClr val="lt1"/>
+                </a:solidFill>
+                <a:latin typeface="+mn-lt"/>
+                <a:ea typeface="+mn-ea"/>
+                <a:cs typeface="+mn-cs"/>
+              </a:defRPr>
+            </a:lvl4pPr>
+            <a:lvl5pPr marL="414589" algn="l" defTabSz="207294" rtl="0" eaLnBrk="1" latinLnBrk="0" hangingPunct="1">
+              <a:defRPr sz="408" kern="1200">
+                <a:solidFill>
+                  <a:schemeClr val="lt1"/>
+                </a:solidFill>
+                <a:latin typeface="+mn-lt"/>
+                <a:ea typeface="+mn-ea"/>
+                <a:cs typeface="+mn-cs"/>
+              </a:defRPr>
+            </a:lvl5pPr>
+            <a:lvl6pPr marL="518236" algn="l" defTabSz="207294" rtl="0" eaLnBrk="1" latinLnBrk="0" hangingPunct="1">
+              <a:defRPr sz="408" kern="1200">
+                <a:solidFill>
+                  <a:schemeClr val="lt1"/>
+                </a:solidFill>
+                <a:latin typeface="+mn-lt"/>
+                <a:ea typeface="+mn-ea"/>
+                <a:cs typeface="+mn-cs"/>
+              </a:defRPr>
+            </a:lvl6pPr>
+            <a:lvl7pPr marL="621883" algn="l" defTabSz="207294" rtl="0" eaLnBrk="1" latinLnBrk="0" hangingPunct="1">
+              <a:defRPr sz="408" kern="1200">
+                <a:solidFill>
+                  <a:schemeClr val="lt1"/>
+                </a:solidFill>
+                <a:latin typeface="+mn-lt"/>
+                <a:ea typeface="+mn-ea"/>
+                <a:cs typeface="+mn-cs"/>
+              </a:defRPr>
+            </a:lvl7pPr>
+            <a:lvl8pPr marL="725531" algn="l" defTabSz="207294" rtl="0" eaLnBrk="1" latinLnBrk="0" hangingPunct="1">
+              <a:defRPr sz="408" kern="1200">
+                <a:solidFill>
+                  <a:schemeClr val="lt1"/>
+                </a:solidFill>
+                <a:latin typeface="+mn-lt"/>
+                <a:ea typeface="+mn-ea"/>
+                <a:cs typeface="+mn-cs"/>
+              </a:defRPr>
+            </a:lvl8pPr>
+            <a:lvl9pPr marL="829178" algn="l" defTabSz="207294" rtl="0" eaLnBrk="1" latinLnBrk="0" hangingPunct="1">
+              <a:defRPr sz="408" kern="1200">
+                <a:solidFill>
+                  <a:schemeClr val="lt1"/>
+                </a:solidFill>
+                <a:latin typeface="+mn-lt"/>
+                <a:ea typeface="+mn-ea"/>
+                <a:cs typeface="+mn-cs"/>
+              </a:defRPr>
+            </a:lvl9pPr>
+          </a:lstStyle>
+          <a:p>
+            <a:pPr algn="ctr"/>
+            <a:endParaRPr lang="zh-CN" altLang="en-US"/>
+          </a:p>
+        </p:txBody>
+      </p:sp>
+      <p:sp>
+        <p:nvSpPr>
+          <p:cNvPr id="16" name="矩形 15"/>
+          <p:cNvSpPr/>
+          <p:nvPr/>
+        </p:nvSpPr>
+        <p:spPr>
+          <a:xfrm>
+            <a:off x="2637990" y="904768"/>
+            <a:ext cx="21600" cy="21600"/>
+          </a:xfrm>
+          <a:prstGeom prst="rect">
+            <a:avLst/>
+          </a:prstGeom>
+          <a:solidFill>
+            <a:schemeClr val="bg1">
+              <a:lumMod val="50000"/>
+            </a:schemeClr>
+          </a:solidFill>
+          <a:ln>
+            <a:solidFill>
+              <a:schemeClr val="tx1"/>
+            </a:solidFill>
+          </a:ln>
+        </p:spPr>
+        <p:style>
+          <a:lnRef idx="2">
+            <a:schemeClr val="accent1">
+              <a:shade val="50000"/>
+            </a:schemeClr>
+          </a:lnRef>
+          <a:fillRef idx="1">
+            <a:schemeClr val="accent1"/>
+          </a:fillRef>
+          <a:effectRef idx="0">
+            <a:schemeClr val="accent1"/>
+          </a:effectRef>
+          <a:fontRef idx="minor">
+            <a:schemeClr val="lt1"/>
+          </a:fontRef>
+        </p:style>
+        <p:txBody>
+          <a:bodyPr rot="0" spcFirstLastPara="0" vert="horz" wrap="square" lIns="91440" tIns="45720" rIns="91440" bIns="45720" numCol="1" spcCol="0" rtlCol="0" fromWordArt="0" anchor="ctr" anchorCtr="0" forceAA="0" compatLnSpc="1">
+            <a:prstTxWarp prst="textNoShape">
               <a:avLst/>
-            </a:prstGeom>
-            <a:noFill/>
-            <a:ln>
-              <a:solidFill>
-                <a:schemeClr val="tx1"/>
-              </a:solidFill>
-            </a:ln>
-          </p:spPr>
-          <p:style>
-            <a:lnRef idx="2">
-              <a:schemeClr val="accent1">
-                <a:shade val="50000"/>
-              </a:schemeClr>
-            </a:lnRef>
-            <a:fillRef idx="1">
-              <a:schemeClr val="accent1"/>
-            </a:fillRef>
-            <a:effectRef idx="0">
-              <a:schemeClr val="accent1"/>
-            </a:effectRef>
-            <a:fontRef idx="minor">
-              <a:schemeClr val="lt1"/>
-            </a:fontRef>
-          </p:style>
-          <p:txBody>
-            <a:bodyPr rot="0" spcFirstLastPara="0" vert="horz" wrap="square" lIns="91440" tIns="45720" rIns="91440" bIns="45720" numCol="1" spcCol="0" rtlCol="0" fromWordArt="0" anchor="ctr" anchorCtr="0" forceAA="0" compatLnSpc="1">
-              <a:prstTxWarp prst="textNoShape">
-                <a:avLst/>
-              </a:prstTxWarp>
-              <a:noAutofit/>
-            </a:bodyPr>
-            <a:lstStyle>
-              <a:defPPr>
-                <a:defRPr lang="zh-CN"/>
-              </a:defPPr>
-              <a:lvl1pPr marL="0" algn="l" defTabSz="207294" rtl="0" eaLnBrk="1" latinLnBrk="0" hangingPunct="1">
-                <a:defRPr sz="408" kern="1200">
-                  <a:solidFill>
-                    <a:schemeClr val="lt1"/>
-                  </a:solidFill>
-                  <a:latin typeface="+mn-lt"/>
-                  <a:ea typeface="+mn-ea"/>
-                  <a:cs typeface="+mn-cs"/>
-                </a:defRPr>
-              </a:lvl1pPr>
-              <a:lvl2pPr marL="103647" algn="l" defTabSz="207294" rtl="0" eaLnBrk="1" latinLnBrk="0" hangingPunct="1">
-                <a:defRPr sz="408" kern="1200">
-                  <a:solidFill>
-                    <a:schemeClr val="lt1"/>
-                  </a:solidFill>
-                  <a:latin typeface="+mn-lt"/>
-                  <a:ea typeface="+mn-ea"/>
-                  <a:cs typeface="+mn-cs"/>
-                </a:defRPr>
-              </a:lvl2pPr>
-              <a:lvl3pPr marL="207294" algn="l" defTabSz="207294" rtl="0" eaLnBrk="1" latinLnBrk="0" hangingPunct="1">
-                <a:defRPr sz="408" kern="1200">
-                  <a:solidFill>
-                    <a:schemeClr val="lt1"/>
-                  </a:solidFill>
-                  <a:latin typeface="+mn-lt"/>
-                  <a:ea typeface="+mn-ea"/>
-                  <a:cs typeface="+mn-cs"/>
-                </a:defRPr>
-              </a:lvl3pPr>
-              <a:lvl4pPr marL="310942" algn="l" defTabSz="207294" rtl="0" eaLnBrk="1" latinLnBrk="0" hangingPunct="1">
-                <a:defRPr sz="408" kern="1200">
-                  <a:solidFill>
-                    <a:schemeClr val="lt1"/>
-                  </a:solidFill>
-                  <a:latin typeface="+mn-lt"/>
-                  <a:ea typeface="+mn-ea"/>
-                  <a:cs typeface="+mn-cs"/>
-                </a:defRPr>
-              </a:lvl4pPr>
-              <a:lvl5pPr marL="414589" algn="l" defTabSz="207294" rtl="0" eaLnBrk="1" latinLnBrk="0" hangingPunct="1">
-                <a:defRPr sz="408" kern="1200">
-                  <a:solidFill>
-                    <a:schemeClr val="lt1"/>
-                  </a:solidFill>
-                  <a:latin typeface="+mn-lt"/>
-                  <a:ea typeface="+mn-ea"/>
-                  <a:cs typeface="+mn-cs"/>
-                </a:defRPr>
-              </a:lvl5pPr>
-              <a:lvl6pPr marL="518236" algn="l" defTabSz="207294" rtl="0" eaLnBrk="1" latinLnBrk="0" hangingPunct="1">
-                <a:defRPr sz="408" kern="1200">
-                  <a:solidFill>
-                    <a:schemeClr val="lt1"/>
-                  </a:solidFill>
-                  <a:latin typeface="+mn-lt"/>
-                  <a:ea typeface="+mn-ea"/>
-                  <a:cs typeface="+mn-cs"/>
-                </a:defRPr>
-              </a:lvl6pPr>
-              <a:lvl7pPr marL="621883" algn="l" defTabSz="207294" rtl="0" eaLnBrk="1" latinLnBrk="0" hangingPunct="1">
-                <a:defRPr sz="408" kern="1200">
-                  <a:solidFill>
-                    <a:schemeClr val="lt1"/>
-                  </a:solidFill>
-                  <a:latin typeface="+mn-lt"/>
-                  <a:ea typeface="+mn-ea"/>
-                  <a:cs typeface="+mn-cs"/>
-                </a:defRPr>
-              </a:lvl7pPr>
-              <a:lvl8pPr marL="725531" algn="l" defTabSz="207294" rtl="0" eaLnBrk="1" latinLnBrk="0" hangingPunct="1">
-                <a:defRPr sz="408" kern="1200">
-                  <a:solidFill>
-                    <a:schemeClr val="lt1"/>
-                  </a:solidFill>
-                  <a:latin typeface="+mn-lt"/>
-                  <a:ea typeface="+mn-ea"/>
-                  <a:cs typeface="+mn-cs"/>
-                </a:defRPr>
-              </a:lvl8pPr>
-              <a:lvl9pPr marL="829178" algn="l" defTabSz="207294" rtl="0" eaLnBrk="1" latinLnBrk="0" hangingPunct="1">
-                <a:defRPr sz="408" kern="1200">
-                  <a:solidFill>
-                    <a:schemeClr val="lt1"/>
-                  </a:solidFill>
-                  <a:latin typeface="+mn-lt"/>
-                  <a:ea typeface="+mn-ea"/>
-                  <a:cs typeface="+mn-cs"/>
-                </a:defRPr>
-              </a:lvl9pPr>
-            </a:lstStyle>
-            <a:p>
-              <a:pPr algn="ctr"/>
-              <a:endParaRPr lang="zh-CN" altLang="en-US"/>
-            </a:p>
-          </p:txBody>
-        </p:sp>
-        <p:sp>
-          <p:nvSpPr>
-            <p:cNvPr id="15" name="矩形 14"/>
-            <p:cNvSpPr/>
-            <p:nvPr/>
-          </p:nvSpPr>
-          <p:spPr>
-            <a:xfrm>
-              <a:off x="2365865" y="904769"/>
-              <a:ext cx="45719" cy="45719"/>
-            </a:xfrm>
-            <a:prstGeom prst="rect">
+            </a:prstTxWarp>
+            <a:noAutofit/>
+          </a:bodyPr>
+          <a:lstStyle>
+            <a:defPPr>
+              <a:defRPr lang="zh-CN"/>
+            </a:defPPr>
+            <a:lvl1pPr marL="0" algn="l" defTabSz="207294" rtl="0" eaLnBrk="1" latinLnBrk="0" hangingPunct="1">
+              <a:defRPr sz="408" kern="1200">
+                <a:solidFill>
+                  <a:schemeClr val="lt1"/>
+                </a:solidFill>
+                <a:latin typeface="+mn-lt"/>
+                <a:ea typeface="+mn-ea"/>
+                <a:cs typeface="+mn-cs"/>
+              </a:defRPr>
+            </a:lvl1pPr>
+            <a:lvl2pPr marL="103647" algn="l" defTabSz="207294" rtl="0" eaLnBrk="1" latinLnBrk="0" hangingPunct="1">
+              <a:defRPr sz="408" kern="1200">
+                <a:solidFill>
+                  <a:schemeClr val="lt1"/>
+                </a:solidFill>
+                <a:latin typeface="+mn-lt"/>
+                <a:ea typeface="+mn-ea"/>
+                <a:cs typeface="+mn-cs"/>
+              </a:defRPr>
+            </a:lvl2pPr>
+            <a:lvl3pPr marL="207294" algn="l" defTabSz="207294" rtl="0" eaLnBrk="1" latinLnBrk="0" hangingPunct="1">
+              <a:defRPr sz="408" kern="1200">
+                <a:solidFill>
+                  <a:schemeClr val="lt1"/>
+                </a:solidFill>
+                <a:latin typeface="+mn-lt"/>
+                <a:ea typeface="+mn-ea"/>
+                <a:cs typeface="+mn-cs"/>
+              </a:defRPr>
+            </a:lvl3pPr>
+            <a:lvl4pPr marL="310942" algn="l" defTabSz="207294" rtl="0" eaLnBrk="1" latinLnBrk="0" hangingPunct="1">
+              <a:defRPr sz="408" kern="1200">
+                <a:solidFill>
+                  <a:schemeClr val="lt1"/>
+                </a:solidFill>
+                <a:latin typeface="+mn-lt"/>
+                <a:ea typeface="+mn-ea"/>
+                <a:cs typeface="+mn-cs"/>
+              </a:defRPr>
+            </a:lvl4pPr>
+            <a:lvl5pPr marL="414589" algn="l" defTabSz="207294" rtl="0" eaLnBrk="1" latinLnBrk="0" hangingPunct="1">
+              <a:defRPr sz="408" kern="1200">
+                <a:solidFill>
+                  <a:schemeClr val="lt1"/>
+                </a:solidFill>
+                <a:latin typeface="+mn-lt"/>
+                <a:ea typeface="+mn-ea"/>
+                <a:cs typeface="+mn-cs"/>
+              </a:defRPr>
+            </a:lvl5pPr>
+            <a:lvl6pPr marL="518236" algn="l" defTabSz="207294" rtl="0" eaLnBrk="1" latinLnBrk="0" hangingPunct="1">
+              <a:defRPr sz="408" kern="1200">
+                <a:solidFill>
+                  <a:schemeClr val="lt1"/>
+                </a:solidFill>
+                <a:latin typeface="+mn-lt"/>
+                <a:ea typeface="+mn-ea"/>
+                <a:cs typeface="+mn-cs"/>
+              </a:defRPr>
+            </a:lvl6pPr>
+            <a:lvl7pPr marL="621883" algn="l" defTabSz="207294" rtl="0" eaLnBrk="1" latinLnBrk="0" hangingPunct="1">
+              <a:defRPr sz="408" kern="1200">
+                <a:solidFill>
+                  <a:schemeClr val="lt1"/>
+                </a:solidFill>
+                <a:latin typeface="+mn-lt"/>
+                <a:ea typeface="+mn-ea"/>
+                <a:cs typeface="+mn-cs"/>
+              </a:defRPr>
+            </a:lvl7pPr>
+            <a:lvl8pPr marL="725531" algn="l" defTabSz="207294" rtl="0" eaLnBrk="1" latinLnBrk="0" hangingPunct="1">
+              <a:defRPr sz="408" kern="1200">
+                <a:solidFill>
+                  <a:schemeClr val="lt1"/>
+                </a:solidFill>
+                <a:latin typeface="+mn-lt"/>
+                <a:ea typeface="+mn-ea"/>
+                <a:cs typeface="+mn-cs"/>
+              </a:defRPr>
+            </a:lvl8pPr>
+            <a:lvl9pPr marL="829178" algn="l" defTabSz="207294" rtl="0" eaLnBrk="1" latinLnBrk="0" hangingPunct="1">
+              <a:defRPr sz="408" kern="1200">
+                <a:solidFill>
+                  <a:schemeClr val="lt1"/>
+                </a:solidFill>
+                <a:latin typeface="+mn-lt"/>
+                <a:ea typeface="+mn-ea"/>
+                <a:cs typeface="+mn-cs"/>
+              </a:defRPr>
+            </a:lvl9pPr>
+          </a:lstStyle>
+          <a:p>
+            <a:pPr algn="ctr"/>
+            <a:endParaRPr lang="zh-CN" altLang="en-US"/>
+          </a:p>
+        </p:txBody>
+      </p:sp>
+      <p:sp>
+        <p:nvSpPr>
+          <p:cNvPr id="17" name="矩形 16"/>
+          <p:cNvSpPr/>
+          <p:nvPr/>
+        </p:nvSpPr>
+        <p:spPr>
+          <a:xfrm>
+            <a:off x="2553956" y="633812"/>
+            <a:ext cx="21600" cy="21600"/>
+          </a:xfrm>
+          <a:prstGeom prst="rect">
+            <a:avLst/>
+          </a:prstGeom>
+          <a:solidFill>
+            <a:schemeClr val="bg1">
+              <a:lumMod val="50000"/>
+            </a:schemeClr>
+          </a:solidFill>
+          <a:ln>
+            <a:solidFill>
+              <a:schemeClr val="tx1"/>
+            </a:solidFill>
+          </a:ln>
+        </p:spPr>
+        <p:style>
+          <a:lnRef idx="2">
+            <a:schemeClr val="accent1">
+              <a:shade val="50000"/>
+            </a:schemeClr>
+          </a:lnRef>
+          <a:fillRef idx="1">
+            <a:schemeClr val="accent1"/>
+          </a:fillRef>
+          <a:effectRef idx="0">
+            <a:schemeClr val="accent1"/>
+          </a:effectRef>
+          <a:fontRef idx="minor">
+            <a:schemeClr val="lt1"/>
+          </a:fontRef>
+        </p:style>
+        <p:txBody>
+          <a:bodyPr rot="0" spcFirstLastPara="0" vert="horz" wrap="square" lIns="91440" tIns="45720" rIns="91440" bIns="45720" numCol="1" spcCol="0" rtlCol="0" fromWordArt="0" anchor="ctr" anchorCtr="0" forceAA="0" compatLnSpc="1">
+            <a:prstTxWarp prst="textNoShape">
               <a:avLst/>
-            </a:prstGeom>
-            <a:noFill/>
-            <a:ln>
-              <a:solidFill>
-                <a:schemeClr val="tx1"/>
-              </a:solidFill>
-            </a:ln>
-          </p:spPr>
-          <p:style>
-            <a:lnRef idx="2">
-              <a:schemeClr val="accent1">
-                <a:shade val="50000"/>
-              </a:schemeClr>
-            </a:lnRef>
-            <a:fillRef idx="1">
-              <a:schemeClr val="accent1"/>
-            </a:fillRef>
-            <a:effectRef idx="0">
-              <a:schemeClr val="accent1"/>
-            </a:effectRef>
-            <a:fontRef idx="minor">
-              <a:schemeClr val="lt1"/>
-            </a:fontRef>
-          </p:style>
-          <p:txBody>
-            <a:bodyPr rot="0" spcFirstLastPara="0" vert="horz" wrap="square" lIns="91440" tIns="45720" rIns="91440" bIns="45720" numCol="1" spcCol="0" rtlCol="0" fromWordArt="0" anchor="ctr" anchorCtr="0" forceAA="0" compatLnSpc="1">
-              <a:prstTxWarp prst="textNoShape">
-                <a:avLst/>
-              </a:prstTxWarp>
-              <a:noAutofit/>
-            </a:bodyPr>
-            <a:lstStyle>
-              <a:defPPr>
-                <a:defRPr lang="zh-CN"/>
-              </a:defPPr>
-              <a:lvl1pPr marL="0" algn="l" defTabSz="207294" rtl="0" eaLnBrk="1" latinLnBrk="0" hangingPunct="1">
-                <a:defRPr sz="408" kern="1200">
-                  <a:solidFill>
-                    <a:schemeClr val="lt1"/>
-                  </a:solidFill>
-                  <a:latin typeface="+mn-lt"/>
-                  <a:ea typeface="+mn-ea"/>
-                  <a:cs typeface="+mn-cs"/>
-                </a:defRPr>
-              </a:lvl1pPr>
-              <a:lvl2pPr marL="103647" algn="l" defTabSz="207294" rtl="0" eaLnBrk="1" latinLnBrk="0" hangingPunct="1">
-                <a:defRPr sz="408" kern="1200">
-                  <a:solidFill>
-                    <a:schemeClr val="lt1"/>
-                  </a:solidFill>
-                  <a:latin typeface="+mn-lt"/>
-                  <a:ea typeface="+mn-ea"/>
-                  <a:cs typeface="+mn-cs"/>
-                </a:defRPr>
-              </a:lvl2pPr>
-              <a:lvl3pPr marL="207294" algn="l" defTabSz="207294" rtl="0" eaLnBrk="1" latinLnBrk="0" hangingPunct="1">
-                <a:defRPr sz="408" kern="1200">
-                  <a:solidFill>
-                    <a:schemeClr val="lt1"/>
-                  </a:solidFill>
-                  <a:latin typeface="+mn-lt"/>
-                  <a:ea typeface="+mn-ea"/>
-                  <a:cs typeface="+mn-cs"/>
-                </a:defRPr>
-              </a:lvl3pPr>
-              <a:lvl4pPr marL="310942" algn="l" defTabSz="207294" rtl="0" eaLnBrk="1" latinLnBrk="0" hangingPunct="1">
-                <a:defRPr sz="408" kern="1200">
-                  <a:solidFill>
-                    <a:schemeClr val="lt1"/>
-                  </a:solidFill>
-                  <a:latin typeface="+mn-lt"/>
-                  <a:ea typeface="+mn-ea"/>
-                  <a:cs typeface="+mn-cs"/>
-                </a:defRPr>
-              </a:lvl4pPr>
-              <a:lvl5pPr marL="414589" algn="l" defTabSz="207294" rtl="0" eaLnBrk="1" latinLnBrk="0" hangingPunct="1">
-                <a:defRPr sz="408" kern="1200">
-                  <a:solidFill>
-                    <a:schemeClr val="lt1"/>
-                  </a:solidFill>
-                  <a:latin typeface="+mn-lt"/>
-                  <a:ea typeface="+mn-ea"/>
-                  <a:cs typeface="+mn-cs"/>
-                </a:defRPr>
-              </a:lvl5pPr>
-              <a:lvl6pPr marL="518236" algn="l" defTabSz="207294" rtl="0" eaLnBrk="1" latinLnBrk="0" hangingPunct="1">
-                <a:defRPr sz="408" kern="1200">
-                  <a:solidFill>
-                    <a:schemeClr val="lt1"/>
-                  </a:solidFill>
-                  <a:latin typeface="+mn-lt"/>
-                  <a:ea typeface="+mn-ea"/>
-                  <a:cs typeface="+mn-cs"/>
-                </a:defRPr>
-              </a:lvl6pPr>
-              <a:lvl7pPr marL="621883" algn="l" defTabSz="207294" rtl="0" eaLnBrk="1" latinLnBrk="0" hangingPunct="1">
-                <a:defRPr sz="408" kern="1200">
-                  <a:solidFill>
-                    <a:schemeClr val="lt1"/>
-                  </a:solidFill>
-                  <a:latin typeface="+mn-lt"/>
-                  <a:ea typeface="+mn-ea"/>
-                  <a:cs typeface="+mn-cs"/>
-                </a:defRPr>
-              </a:lvl7pPr>
-              <a:lvl8pPr marL="725531" algn="l" defTabSz="207294" rtl="0" eaLnBrk="1" latinLnBrk="0" hangingPunct="1">
-                <a:defRPr sz="408" kern="1200">
-                  <a:solidFill>
-                    <a:schemeClr val="lt1"/>
-                  </a:solidFill>
-                  <a:latin typeface="+mn-lt"/>
-                  <a:ea typeface="+mn-ea"/>
-                  <a:cs typeface="+mn-cs"/>
-                </a:defRPr>
-              </a:lvl8pPr>
-              <a:lvl9pPr marL="829178" algn="l" defTabSz="207294" rtl="0" eaLnBrk="1" latinLnBrk="0" hangingPunct="1">
-                <a:defRPr sz="408" kern="1200">
-                  <a:solidFill>
-                    <a:schemeClr val="lt1"/>
-                  </a:solidFill>
-                  <a:latin typeface="+mn-lt"/>
-                  <a:ea typeface="+mn-ea"/>
-                  <a:cs typeface="+mn-cs"/>
-                </a:defRPr>
-              </a:lvl9pPr>
-            </a:lstStyle>
-            <a:p>
-              <a:pPr algn="ctr"/>
-              <a:endParaRPr lang="zh-CN" altLang="en-US"/>
-            </a:p>
-          </p:txBody>
-        </p:sp>
-        <p:sp>
-          <p:nvSpPr>
-            <p:cNvPr id="16" name="矩形 15"/>
-            <p:cNvSpPr/>
-            <p:nvPr/>
-          </p:nvSpPr>
-          <p:spPr>
-            <a:xfrm>
-              <a:off x="2637990" y="904769"/>
-              <a:ext cx="45719" cy="45719"/>
-            </a:xfrm>
-            <a:prstGeom prst="rect">
+            </a:prstTxWarp>
+            <a:noAutofit/>
+          </a:bodyPr>
+          <a:lstStyle>
+            <a:defPPr>
+              <a:defRPr lang="zh-CN"/>
+            </a:defPPr>
+            <a:lvl1pPr marL="0" algn="l" defTabSz="207294" rtl="0" eaLnBrk="1" latinLnBrk="0" hangingPunct="1">
+              <a:defRPr sz="408" kern="1200">
+                <a:solidFill>
+                  <a:schemeClr val="lt1"/>
+                </a:solidFill>
+                <a:latin typeface="+mn-lt"/>
+                <a:ea typeface="+mn-ea"/>
+                <a:cs typeface="+mn-cs"/>
+              </a:defRPr>
+            </a:lvl1pPr>
+            <a:lvl2pPr marL="103647" algn="l" defTabSz="207294" rtl="0" eaLnBrk="1" latinLnBrk="0" hangingPunct="1">
+              <a:defRPr sz="408" kern="1200">
+                <a:solidFill>
+                  <a:schemeClr val="lt1"/>
+                </a:solidFill>
+                <a:latin typeface="+mn-lt"/>
+                <a:ea typeface="+mn-ea"/>
+                <a:cs typeface="+mn-cs"/>
+              </a:defRPr>
+            </a:lvl2pPr>
+            <a:lvl3pPr marL="207294" algn="l" defTabSz="207294" rtl="0" eaLnBrk="1" latinLnBrk="0" hangingPunct="1">
+              <a:defRPr sz="408" kern="1200">
+                <a:solidFill>
+                  <a:schemeClr val="lt1"/>
+                </a:solidFill>
+                <a:latin typeface="+mn-lt"/>
+                <a:ea typeface="+mn-ea"/>
+                <a:cs typeface="+mn-cs"/>
+              </a:defRPr>
+            </a:lvl3pPr>
+            <a:lvl4pPr marL="310942" algn="l" defTabSz="207294" rtl="0" eaLnBrk="1" latinLnBrk="0" hangingPunct="1">
+              <a:defRPr sz="408" kern="1200">
+                <a:solidFill>
+                  <a:schemeClr val="lt1"/>
+                </a:solidFill>
+                <a:latin typeface="+mn-lt"/>
+                <a:ea typeface="+mn-ea"/>
+                <a:cs typeface="+mn-cs"/>
+              </a:defRPr>
+            </a:lvl4pPr>
+            <a:lvl5pPr marL="414589" algn="l" defTabSz="207294" rtl="0" eaLnBrk="1" latinLnBrk="0" hangingPunct="1">
+              <a:defRPr sz="408" kern="1200">
+                <a:solidFill>
+                  <a:schemeClr val="lt1"/>
+                </a:solidFill>
+                <a:latin typeface="+mn-lt"/>
+                <a:ea typeface="+mn-ea"/>
+                <a:cs typeface="+mn-cs"/>
+              </a:defRPr>
+            </a:lvl5pPr>
+            <a:lvl6pPr marL="518236" algn="l" defTabSz="207294" rtl="0" eaLnBrk="1" latinLnBrk="0" hangingPunct="1">
+              <a:defRPr sz="408" kern="1200">
+                <a:solidFill>
+                  <a:schemeClr val="lt1"/>
+                </a:solidFill>
+                <a:latin typeface="+mn-lt"/>
+                <a:ea typeface="+mn-ea"/>
+                <a:cs typeface="+mn-cs"/>
+              </a:defRPr>
+            </a:lvl6pPr>
+            <a:lvl7pPr marL="621883" algn="l" defTabSz="207294" rtl="0" eaLnBrk="1" latinLnBrk="0" hangingPunct="1">
+              <a:defRPr sz="408" kern="1200">
+                <a:solidFill>
+                  <a:schemeClr val="lt1"/>
+                </a:solidFill>
+                <a:latin typeface="+mn-lt"/>
+                <a:ea typeface="+mn-ea"/>
+                <a:cs typeface="+mn-cs"/>
+              </a:defRPr>
+            </a:lvl7pPr>
+            <a:lvl8pPr marL="725531" algn="l" defTabSz="207294" rtl="0" eaLnBrk="1" latinLnBrk="0" hangingPunct="1">
+              <a:defRPr sz="408" kern="1200">
+                <a:solidFill>
+                  <a:schemeClr val="lt1"/>
+                </a:solidFill>
+                <a:latin typeface="+mn-lt"/>
+                <a:ea typeface="+mn-ea"/>
+                <a:cs typeface="+mn-cs"/>
+              </a:defRPr>
+            </a:lvl8pPr>
+            <a:lvl9pPr marL="829178" algn="l" defTabSz="207294" rtl="0" eaLnBrk="1" latinLnBrk="0" hangingPunct="1">
+              <a:defRPr sz="408" kern="1200">
+                <a:solidFill>
+                  <a:schemeClr val="lt1"/>
+                </a:solidFill>
+                <a:latin typeface="+mn-lt"/>
+                <a:ea typeface="+mn-ea"/>
+                <a:cs typeface="+mn-cs"/>
+              </a:defRPr>
+            </a:lvl9pPr>
+          </a:lstStyle>
+          <a:p>
+            <a:pPr algn="ctr"/>
+            <a:endParaRPr lang="zh-CN" altLang="en-US"/>
+          </a:p>
+        </p:txBody>
+      </p:sp>
+      <p:sp>
+        <p:nvSpPr>
+          <p:cNvPr id="18" name="矩形 17"/>
+          <p:cNvSpPr/>
+          <p:nvPr/>
+        </p:nvSpPr>
+        <p:spPr>
+          <a:xfrm>
+            <a:off x="2429841" y="419191"/>
+            <a:ext cx="21600" cy="21600"/>
+          </a:xfrm>
+          <a:prstGeom prst="rect">
+            <a:avLst/>
+          </a:prstGeom>
+          <a:solidFill>
+            <a:schemeClr val="bg1">
+              <a:lumMod val="50000"/>
+            </a:schemeClr>
+          </a:solidFill>
+          <a:ln>
+            <a:solidFill>
+              <a:schemeClr val="tx1"/>
+            </a:solidFill>
+          </a:ln>
+        </p:spPr>
+        <p:style>
+          <a:lnRef idx="2">
+            <a:schemeClr val="accent1">
+              <a:shade val="50000"/>
+            </a:schemeClr>
+          </a:lnRef>
+          <a:fillRef idx="1">
+            <a:schemeClr val="accent1"/>
+          </a:fillRef>
+          <a:effectRef idx="0">
+            <a:schemeClr val="accent1"/>
+          </a:effectRef>
+          <a:fontRef idx="minor">
+            <a:schemeClr val="lt1"/>
+          </a:fontRef>
+        </p:style>
+        <p:txBody>
+          <a:bodyPr rot="0" spcFirstLastPara="0" vert="horz" wrap="square" lIns="91440" tIns="45720" rIns="91440" bIns="45720" numCol="1" spcCol="0" rtlCol="0" fromWordArt="0" anchor="ctr" anchorCtr="0" forceAA="0" compatLnSpc="1">
+            <a:prstTxWarp prst="textNoShape">
               <a:avLst/>
-            </a:prstGeom>
-            <a:noFill/>
-            <a:ln>
-              <a:solidFill>
-                <a:schemeClr val="tx1"/>
-              </a:solidFill>
-            </a:ln>
-          </p:spPr>
-          <p:style>
-            <a:lnRef idx="2">
-              <a:schemeClr val="accent1">
-                <a:shade val="50000"/>
-              </a:schemeClr>
-            </a:lnRef>
-            <a:fillRef idx="1">
-              <a:schemeClr val="accent1"/>
-            </a:fillRef>
-            <a:effectRef idx="0">
-              <a:schemeClr val="accent1"/>
-            </a:effectRef>
-            <a:fontRef idx="minor">
-              <a:schemeClr val="lt1"/>
-            </a:fontRef>
-          </p:style>
-          <p:txBody>
-            <a:bodyPr rot="0" spcFirstLastPara="0" vert="horz" wrap="square" lIns="91440" tIns="45720" rIns="91440" bIns="45720" numCol="1" spcCol="0" rtlCol="0" fromWordArt="0" anchor="ctr" anchorCtr="0" forceAA="0" compatLnSpc="1">
-              <a:prstTxWarp prst="textNoShape">
-                <a:avLst/>
-              </a:prstTxWarp>
-              <a:noAutofit/>
-            </a:bodyPr>
-            <a:lstStyle>
-              <a:defPPr>
-                <a:defRPr lang="zh-CN"/>
-              </a:defPPr>
-              <a:lvl1pPr marL="0" algn="l" defTabSz="207294" rtl="0" eaLnBrk="1" latinLnBrk="0" hangingPunct="1">
-                <a:defRPr sz="408" kern="1200">
-                  <a:solidFill>
-                    <a:schemeClr val="lt1"/>
-                  </a:solidFill>
-                  <a:latin typeface="+mn-lt"/>
-                  <a:ea typeface="+mn-ea"/>
-                  <a:cs typeface="+mn-cs"/>
-                </a:defRPr>
-              </a:lvl1pPr>
-              <a:lvl2pPr marL="103647" algn="l" defTabSz="207294" rtl="0" eaLnBrk="1" latinLnBrk="0" hangingPunct="1">
-                <a:defRPr sz="408" kern="1200">
-                  <a:solidFill>
-                    <a:schemeClr val="lt1"/>
-                  </a:solidFill>
-                  <a:latin typeface="+mn-lt"/>
-                  <a:ea typeface="+mn-ea"/>
-                  <a:cs typeface="+mn-cs"/>
-                </a:defRPr>
-              </a:lvl2pPr>
-              <a:lvl3pPr marL="207294" algn="l" defTabSz="207294" rtl="0" eaLnBrk="1" latinLnBrk="0" hangingPunct="1">
-                <a:defRPr sz="408" kern="1200">
-                  <a:solidFill>
-                    <a:schemeClr val="lt1"/>
-                  </a:solidFill>
-                  <a:latin typeface="+mn-lt"/>
-                  <a:ea typeface="+mn-ea"/>
-                  <a:cs typeface="+mn-cs"/>
-                </a:defRPr>
-              </a:lvl3pPr>
-              <a:lvl4pPr marL="310942" algn="l" defTabSz="207294" rtl="0" eaLnBrk="1" latinLnBrk="0" hangingPunct="1">
-                <a:defRPr sz="408" kern="1200">
-                  <a:solidFill>
-                    <a:schemeClr val="lt1"/>
-                  </a:solidFill>
-                  <a:latin typeface="+mn-lt"/>
-                  <a:ea typeface="+mn-ea"/>
-                  <a:cs typeface="+mn-cs"/>
-                </a:defRPr>
-              </a:lvl4pPr>
-              <a:lvl5pPr marL="414589" algn="l" defTabSz="207294" rtl="0" eaLnBrk="1" latinLnBrk="0" hangingPunct="1">
-                <a:defRPr sz="408" kern="1200">
-                  <a:solidFill>
-                    <a:schemeClr val="lt1"/>
-                  </a:solidFill>
-                  <a:latin typeface="+mn-lt"/>
-                  <a:ea typeface="+mn-ea"/>
-                  <a:cs typeface="+mn-cs"/>
-                </a:defRPr>
-              </a:lvl5pPr>
-              <a:lvl6pPr marL="518236" algn="l" defTabSz="207294" rtl="0" eaLnBrk="1" latinLnBrk="0" hangingPunct="1">
-                <a:defRPr sz="408" kern="1200">
-                  <a:solidFill>
-                    <a:schemeClr val="lt1"/>
-                  </a:solidFill>
-                  <a:latin typeface="+mn-lt"/>
-                  <a:ea typeface="+mn-ea"/>
-                  <a:cs typeface="+mn-cs"/>
-                </a:defRPr>
-              </a:lvl6pPr>
-              <a:lvl7pPr marL="621883" algn="l" defTabSz="207294" rtl="0" eaLnBrk="1" latinLnBrk="0" hangingPunct="1">
-                <a:defRPr sz="408" kern="1200">
-                  <a:solidFill>
-                    <a:schemeClr val="lt1"/>
-                  </a:solidFill>
-                  <a:latin typeface="+mn-lt"/>
-                  <a:ea typeface="+mn-ea"/>
-                  <a:cs typeface="+mn-cs"/>
-                </a:defRPr>
-              </a:lvl7pPr>
-              <a:lvl8pPr marL="725531" algn="l" defTabSz="207294" rtl="0" eaLnBrk="1" latinLnBrk="0" hangingPunct="1">
-                <a:defRPr sz="408" kern="1200">
-                  <a:solidFill>
-                    <a:schemeClr val="lt1"/>
-                  </a:solidFill>
-                  <a:latin typeface="+mn-lt"/>
-                  <a:ea typeface="+mn-ea"/>
-                  <a:cs typeface="+mn-cs"/>
-                </a:defRPr>
-              </a:lvl8pPr>
-              <a:lvl9pPr marL="829178" algn="l" defTabSz="207294" rtl="0" eaLnBrk="1" latinLnBrk="0" hangingPunct="1">
-                <a:defRPr sz="408" kern="1200">
-                  <a:solidFill>
-                    <a:schemeClr val="lt1"/>
-                  </a:solidFill>
-                  <a:latin typeface="+mn-lt"/>
-                  <a:ea typeface="+mn-ea"/>
-                  <a:cs typeface="+mn-cs"/>
-                </a:defRPr>
-              </a:lvl9pPr>
-            </a:lstStyle>
-            <a:p>
-              <a:pPr algn="ctr"/>
-              <a:endParaRPr lang="zh-CN" altLang="en-US"/>
-            </a:p>
-          </p:txBody>
-        </p:sp>
-        <p:sp>
-          <p:nvSpPr>
-            <p:cNvPr id="17" name="矩形 16"/>
-            <p:cNvSpPr/>
-            <p:nvPr/>
-          </p:nvSpPr>
-          <p:spPr>
-            <a:xfrm>
-              <a:off x="2553956" y="633813"/>
-              <a:ext cx="45719" cy="45719"/>
-            </a:xfrm>
-            <a:prstGeom prst="rect">
-              <a:avLst/>
-            </a:prstGeom>
-            <a:noFill/>
-            <a:ln>
-              <a:solidFill>
-                <a:schemeClr val="tx1"/>
-              </a:solidFill>
-            </a:ln>
-          </p:spPr>
-          <p:style>
-            <a:lnRef idx="2">
-              <a:schemeClr val="accent1">
-                <a:shade val="50000"/>
-              </a:schemeClr>
-            </a:lnRef>
-            <a:fillRef idx="1">
-              <a:schemeClr val="accent1"/>
-            </a:fillRef>
-            <a:effectRef idx="0">
-              <a:schemeClr val="accent1"/>
-            </a:effectRef>
-            <a:fontRef idx="minor">
-              <a:schemeClr val="lt1"/>
-            </a:fontRef>
-          </p:style>
-          <p:txBody>
-            <a:bodyPr rot="0" spcFirstLastPara="0" vert="horz" wrap="square" lIns="91440" tIns="45720" rIns="91440" bIns="45720" numCol="1" spcCol="0" rtlCol="0" fromWordArt="0" anchor="ctr" anchorCtr="0" forceAA="0" compatLnSpc="1">
-              <a:prstTxWarp prst="textNoShape">
-                <a:avLst/>
-              </a:prstTxWarp>
-              <a:noAutofit/>
-            </a:bodyPr>
-            <a:lstStyle>
-              <a:defPPr>
-                <a:defRPr lang="zh-CN"/>
-              </a:defPPr>
-              <a:lvl1pPr marL="0" algn="l" defTabSz="207294" rtl="0" eaLnBrk="1" latinLnBrk="0" hangingPunct="1">
-                <a:defRPr sz="408" kern="1200">
-                  <a:solidFill>
-                    <a:schemeClr val="lt1"/>
-                  </a:solidFill>
-                  <a:latin typeface="+mn-lt"/>
-                  <a:ea typeface="+mn-ea"/>
-                  <a:cs typeface="+mn-cs"/>
-                </a:defRPr>
-              </a:lvl1pPr>
-              <a:lvl2pPr marL="103647" algn="l" defTabSz="207294" rtl="0" eaLnBrk="1" latinLnBrk="0" hangingPunct="1">
-                <a:defRPr sz="408" kern="1200">
-                  <a:solidFill>
-                    <a:schemeClr val="lt1"/>
-                  </a:solidFill>
-                  <a:latin typeface="+mn-lt"/>
-                  <a:ea typeface="+mn-ea"/>
-                  <a:cs typeface="+mn-cs"/>
-                </a:defRPr>
-              </a:lvl2pPr>
-              <a:lvl3pPr marL="207294" algn="l" defTabSz="207294" rtl="0" eaLnBrk="1" latinLnBrk="0" hangingPunct="1">
-                <a:defRPr sz="408" kern="1200">
-                  <a:solidFill>
-                    <a:schemeClr val="lt1"/>
-                  </a:solidFill>
-                  <a:latin typeface="+mn-lt"/>
-                  <a:ea typeface="+mn-ea"/>
-                  <a:cs typeface="+mn-cs"/>
-                </a:defRPr>
-              </a:lvl3pPr>
-              <a:lvl4pPr marL="310942" algn="l" defTabSz="207294" rtl="0" eaLnBrk="1" latinLnBrk="0" hangingPunct="1">
-                <a:defRPr sz="408" kern="1200">
-                  <a:solidFill>
-                    <a:schemeClr val="lt1"/>
-                  </a:solidFill>
-                  <a:latin typeface="+mn-lt"/>
-                  <a:ea typeface="+mn-ea"/>
-                  <a:cs typeface="+mn-cs"/>
-                </a:defRPr>
-              </a:lvl4pPr>
-              <a:lvl5pPr marL="414589" algn="l" defTabSz="207294" rtl="0" eaLnBrk="1" latinLnBrk="0" hangingPunct="1">
-                <a:defRPr sz="408" kern="1200">
-                  <a:solidFill>
-                    <a:schemeClr val="lt1"/>
-                  </a:solidFill>
-                  <a:latin typeface="+mn-lt"/>
-                  <a:ea typeface="+mn-ea"/>
-                  <a:cs typeface="+mn-cs"/>
-                </a:defRPr>
-              </a:lvl5pPr>
-              <a:lvl6pPr marL="518236" algn="l" defTabSz="207294" rtl="0" eaLnBrk="1" latinLnBrk="0" hangingPunct="1">
-                <a:defRPr sz="408" kern="1200">
-                  <a:solidFill>
-                    <a:schemeClr val="lt1"/>
-                  </a:solidFill>
-                  <a:latin typeface="+mn-lt"/>
-                  <a:ea typeface="+mn-ea"/>
-                  <a:cs typeface="+mn-cs"/>
-                </a:defRPr>
-              </a:lvl6pPr>
-              <a:lvl7pPr marL="621883" algn="l" defTabSz="207294" rtl="0" eaLnBrk="1" latinLnBrk="0" hangingPunct="1">
-                <a:defRPr sz="408" kern="1200">
-                  <a:solidFill>
-                    <a:schemeClr val="lt1"/>
-                  </a:solidFill>
-                  <a:latin typeface="+mn-lt"/>
-                  <a:ea typeface="+mn-ea"/>
-                  <a:cs typeface="+mn-cs"/>
-                </a:defRPr>
-              </a:lvl7pPr>
-              <a:lvl8pPr marL="725531" algn="l" defTabSz="207294" rtl="0" eaLnBrk="1" latinLnBrk="0" hangingPunct="1">
-                <a:defRPr sz="408" kern="1200">
-                  <a:solidFill>
-                    <a:schemeClr val="lt1"/>
-                  </a:solidFill>
-                  <a:latin typeface="+mn-lt"/>
-                  <a:ea typeface="+mn-ea"/>
-                  <a:cs typeface="+mn-cs"/>
-                </a:defRPr>
-              </a:lvl8pPr>
-              <a:lvl9pPr marL="829178" algn="l" defTabSz="207294" rtl="0" eaLnBrk="1" latinLnBrk="0" hangingPunct="1">
-                <a:defRPr sz="408" kern="1200">
-                  <a:solidFill>
-                    <a:schemeClr val="lt1"/>
-                  </a:solidFill>
-                  <a:latin typeface="+mn-lt"/>
-                  <a:ea typeface="+mn-ea"/>
-                  <a:cs typeface="+mn-cs"/>
-                </a:defRPr>
-              </a:lvl9pPr>
-            </a:lstStyle>
-            <a:p>
-              <a:pPr algn="ctr"/>
-              <a:endParaRPr lang="zh-CN" altLang="en-US"/>
-            </a:p>
-          </p:txBody>
-        </p:sp>
-        <p:sp>
-          <p:nvSpPr>
-            <p:cNvPr id="18" name="矩形 17"/>
-            <p:cNvSpPr/>
-            <p:nvPr/>
-          </p:nvSpPr>
-          <p:spPr>
-            <a:xfrm>
-              <a:off x="2429841" y="419192"/>
-              <a:ext cx="45719" cy="45719"/>
-            </a:xfrm>
-            <a:prstGeom prst="rect">
-              <a:avLst/>
-            </a:prstGeom>
-            <a:noFill/>
-            <a:ln>
-              <a:solidFill>
-                <a:schemeClr val="tx1"/>
-              </a:solidFill>
-            </a:ln>
-          </p:spPr>
-          <p:style>
-            <a:lnRef idx="2">
-              <a:schemeClr val="accent1">
-                <a:shade val="50000"/>
-              </a:schemeClr>
-            </a:lnRef>
-            <a:fillRef idx="1">
-              <a:schemeClr val="accent1"/>
-            </a:fillRef>
-            <a:effectRef idx="0">
-              <a:schemeClr val="accent1"/>
-            </a:effectRef>
-            <a:fontRef idx="minor">
-              <a:schemeClr val="lt1"/>
-            </a:fontRef>
-          </p:style>
-          <p:txBody>
-            <a:bodyPr rot="0" spcFirstLastPara="0" vert="horz" wrap="square" lIns="91440" tIns="45720" rIns="91440" bIns="45720" numCol="1" spcCol="0" rtlCol="0" fromWordArt="0" anchor="ctr" anchorCtr="0" forceAA="0" compatLnSpc="1">
-              <a:prstTxWarp prst="textNoShape">
-                <a:avLst/>
-              </a:prstTxWarp>
-              <a:noAutofit/>
-            </a:bodyPr>
-            <a:lstStyle>
-              <a:defPPr>
-                <a:defRPr lang="zh-CN"/>
-              </a:defPPr>
-              <a:lvl1pPr marL="0" algn="l" defTabSz="207294" rtl="0" eaLnBrk="1" latinLnBrk="0" hangingPunct="1">
-                <a:defRPr sz="408" kern="1200">
-                  <a:solidFill>
-                    <a:schemeClr val="lt1"/>
-                  </a:solidFill>
-                  <a:latin typeface="+mn-lt"/>
-                  <a:ea typeface="+mn-ea"/>
-                  <a:cs typeface="+mn-cs"/>
-                </a:defRPr>
-              </a:lvl1pPr>
-              <a:lvl2pPr marL="103647" algn="l" defTabSz="207294" rtl="0" eaLnBrk="1" latinLnBrk="0" hangingPunct="1">
-                <a:defRPr sz="408" kern="1200">
-                  <a:solidFill>
-                    <a:schemeClr val="lt1"/>
-                  </a:solidFill>
-                  <a:latin typeface="+mn-lt"/>
-                  <a:ea typeface="+mn-ea"/>
-                  <a:cs typeface="+mn-cs"/>
-                </a:defRPr>
-              </a:lvl2pPr>
-              <a:lvl3pPr marL="207294" algn="l" defTabSz="207294" rtl="0" eaLnBrk="1" latinLnBrk="0" hangingPunct="1">
-                <a:defRPr sz="408" kern="1200">
-                  <a:solidFill>
-                    <a:schemeClr val="lt1"/>
-                  </a:solidFill>
-                  <a:latin typeface="+mn-lt"/>
-                  <a:ea typeface="+mn-ea"/>
-                  <a:cs typeface="+mn-cs"/>
-                </a:defRPr>
-              </a:lvl3pPr>
-              <a:lvl4pPr marL="310942" algn="l" defTabSz="207294" rtl="0" eaLnBrk="1" latinLnBrk="0" hangingPunct="1">
-                <a:defRPr sz="408" kern="1200">
-                  <a:solidFill>
-                    <a:schemeClr val="lt1"/>
-                  </a:solidFill>
-                  <a:latin typeface="+mn-lt"/>
-                  <a:ea typeface="+mn-ea"/>
-                  <a:cs typeface="+mn-cs"/>
-                </a:defRPr>
-              </a:lvl4pPr>
-              <a:lvl5pPr marL="414589" algn="l" defTabSz="207294" rtl="0" eaLnBrk="1" latinLnBrk="0" hangingPunct="1">
-                <a:defRPr sz="408" kern="1200">
-                  <a:solidFill>
-                    <a:schemeClr val="lt1"/>
-                  </a:solidFill>
-                  <a:latin typeface="+mn-lt"/>
-                  <a:ea typeface="+mn-ea"/>
-                  <a:cs typeface="+mn-cs"/>
-                </a:defRPr>
-              </a:lvl5pPr>
-              <a:lvl6pPr marL="518236" algn="l" defTabSz="207294" rtl="0" eaLnBrk="1" latinLnBrk="0" hangingPunct="1">
-                <a:defRPr sz="408" kern="1200">
-                  <a:solidFill>
-                    <a:schemeClr val="lt1"/>
-                  </a:solidFill>
-                  <a:latin typeface="+mn-lt"/>
-                  <a:ea typeface="+mn-ea"/>
-                  <a:cs typeface="+mn-cs"/>
-                </a:defRPr>
-              </a:lvl6pPr>
-              <a:lvl7pPr marL="621883" algn="l" defTabSz="207294" rtl="0" eaLnBrk="1" latinLnBrk="0" hangingPunct="1">
-                <a:defRPr sz="408" kern="1200">
-                  <a:solidFill>
-                    <a:schemeClr val="lt1"/>
-                  </a:solidFill>
-                  <a:latin typeface="+mn-lt"/>
-                  <a:ea typeface="+mn-ea"/>
-                  <a:cs typeface="+mn-cs"/>
-                </a:defRPr>
-              </a:lvl7pPr>
-              <a:lvl8pPr marL="725531" algn="l" defTabSz="207294" rtl="0" eaLnBrk="1" latinLnBrk="0" hangingPunct="1">
-                <a:defRPr sz="408" kern="1200">
-                  <a:solidFill>
-                    <a:schemeClr val="lt1"/>
-                  </a:solidFill>
-                  <a:latin typeface="+mn-lt"/>
-                  <a:ea typeface="+mn-ea"/>
-                  <a:cs typeface="+mn-cs"/>
-                </a:defRPr>
-              </a:lvl8pPr>
-              <a:lvl9pPr marL="829178" algn="l" defTabSz="207294" rtl="0" eaLnBrk="1" latinLnBrk="0" hangingPunct="1">
-                <a:defRPr sz="408" kern="1200">
-                  <a:solidFill>
-                    <a:schemeClr val="lt1"/>
-                  </a:solidFill>
-                  <a:latin typeface="+mn-lt"/>
-                  <a:ea typeface="+mn-ea"/>
-                  <a:cs typeface="+mn-cs"/>
-                </a:defRPr>
-              </a:lvl9pPr>
-            </a:lstStyle>
-            <a:p>
-              <a:pPr algn="ctr"/>
-              <a:endParaRPr lang="zh-CN" altLang="en-US"/>
-            </a:p>
-          </p:txBody>
-        </p:sp>
-      </p:grpSp>
+            </a:prstTxWarp>
+            <a:noAutofit/>
+          </a:bodyPr>
+          <a:lstStyle>
+            <a:defPPr>
+              <a:defRPr lang="zh-CN"/>
+            </a:defPPr>
+            <a:lvl1pPr marL="0" algn="l" defTabSz="207294" rtl="0" eaLnBrk="1" latinLnBrk="0" hangingPunct="1">
+              <a:defRPr sz="408" kern="1200">
+                <a:solidFill>
+                  <a:schemeClr val="lt1"/>
+                </a:solidFill>
+                <a:latin typeface="+mn-lt"/>
+                <a:ea typeface="+mn-ea"/>
+                <a:cs typeface="+mn-cs"/>
+              </a:defRPr>
+            </a:lvl1pPr>
+            <a:lvl2pPr marL="103647" algn="l" defTabSz="207294" rtl="0" eaLnBrk="1" latinLnBrk="0" hangingPunct="1">
+              <a:defRPr sz="408" kern="1200">
+                <a:solidFill>
+                  <a:schemeClr val="lt1"/>
+                </a:solidFill>
+                <a:latin typeface="+mn-lt"/>
+                <a:ea typeface="+mn-ea"/>
+                <a:cs typeface="+mn-cs"/>
+              </a:defRPr>
+            </a:lvl2pPr>
+            <a:lvl3pPr marL="207294" algn="l" defTabSz="207294" rtl="0" eaLnBrk="1" latinLnBrk="0" hangingPunct="1">
+              <a:defRPr sz="408" kern="1200">
+                <a:solidFill>
+                  <a:schemeClr val="lt1"/>
+                </a:solidFill>
+                <a:latin typeface="+mn-lt"/>
+                <a:ea typeface="+mn-ea"/>
+                <a:cs typeface="+mn-cs"/>
+              </a:defRPr>
+            </a:lvl3pPr>
+            <a:lvl4pPr marL="310942" algn="l" defTabSz="207294" rtl="0" eaLnBrk="1" latinLnBrk="0" hangingPunct="1">
+              <a:defRPr sz="408" kern="1200">
+                <a:solidFill>
+                  <a:schemeClr val="lt1"/>
+                </a:solidFill>
+                <a:latin typeface="+mn-lt"/>
+                <a:ea typeface="+mn-ea"/>
+                <a:cs typeface="+mn-cs"/>
+              </a:defRPr>
+            </a:lvl4pPr>
+            <a:lvl5pPr marL="414589" algn="l" defTabSz="207294" rtl="0" eaLnBrk="1" latinLnBrk="0" hangingPunct="1">
+              <a:defRPr sz="408" kern="1200">
+                <a:solidFill>
+                  <a:schemeClr val="lt1"/>
+                </a:solidFill>
+                <a:latin typeface="+mn-lt"/>
+                <a:ea typeface="+mn-ea"/>
+                <a:cs typeface="+mn-cs"/>
+              </a:defRPr>
+            </a:lvl5pPr>
+            <a:lvl6pPr marL="518236" algn="l" defTabSz="207294" rtl="0" eaLnBrk="1" latinLnBrk="0" hangingPunct="1">
+              <a:defRPr sz="408" kern="1200">
+                <a:solidFill>
+                  <a:schemeClr val="lt1"/>
+                </a:solidFill>
+                <a:latin typeface="+mn-lt"/>
+                <a:ea typeface="+mn-ea"/>
+                <a:cs typeface="+mn-cs"/>
+              </a:defRPr>
+            </a:lvl6pPr>
+            <a:lvl7pPr marL="621883" algn="l" defTabSz="207294" rtl="0" eaLnBrk="1" latinLnBrk="0" hangingPunct="1">
+              <a:defRPr sz="408" kern="1200">
+                <a:solidFill>
+                  <a:schemeClr val="lt1"/>
+                </a:solidFill>
+                <a:latin typeface="+mn-lt"/>
+                <a:ea typeface="+mn-ea"/>
+                <a:cs typeface="+mn-cs"/>
+              </a:defRPr>
+            </a:lvl7pPr>
+            <a:lvl8pPr marL="725531" algn="l" defTabSz="207294" rtl="0" eaLnBrk="1" latinLnBrk="0" hangingPunct="1">
+              <a:defRPr sz="408" kern="1200">
+                <a:solidFill>
+                  <a:schemeClr val="lt1"/>
+                </a:solidFill>
+                <a:latin typeface="+mn-lt"/>
+                <a:ea typeface="+mn-ea"/>
+                <a:cs typeface="+mn-cs"/>
+              </a:defRPr>
+            </a:lvl8pPr>
+            <a:lvl9pPr marL="829178" algn="l" defTabSz="207294" rtl="0" eaLnBrk="1" latinLnBrk="0" hangingPunct="1">
+              <a:defRPr sz="408" kern="1200">
+                <a:solidFill>
+                  <a:schemeClr val="lt1"/>
+                </a:solidFill>
+                <a:latin typeface="+mn-lt"/>
+                <a:ea typeface="+mn-ea"/>
+                <a:cs typeface="+mn-cs"/>
+              </a:defRPr>
+            </a:lvl9pPr>
+          </a:lstStyle>
+          <a:p>
+            <a:pPr algn="ctr"/>
+            <a:endParaRPr lang="zh-CN" altLang="en-US"/>
+          </a:p>
+        </p:txBody>
+      </p:sp>
     </p:spTree>
     <p:extLst>
       <p:ext uri="{BB962C8B-B14F-4D97-AF65-F5344CB8AC3E}">
@@ -4546,7 +4538,7 @@
     </a:clrScheme>
     <a:fontScheme name="Office 主题">
       <a:majorFont>
-        <a:latin typeface="Calibri Light" panose="020F0302020204030204"/>
+        <a:latin typeface="Calibri Light"/>
         <a:ea typeface=""/>
         <a:cs typeface=""/>
         <a:font script="Jpan" typeface="ＭＳ Ｐゴシック"/>
@@ -4581,7 +4573,7 @@
         <a:font script="Geor" typeface="Sylfaen"/>
       </a:majorFont>
       <a:minorFont>
-        <a:latin typeface="Calibri" panose="020F0502020204030204"/>
+        <a:latin typeface="Calibri"/>
         <a:ea typeface=""/>
         <a:cs typeface=""/>
         <a:font script="Jpan" typeface="ＭＳ Ｐゴシック"/>
@@ -4758,7 +4750,7 @@
   <a:extraClrSchemeLst/>
   <a:extLst>
     <a:ext uri="{05A4C25C-085E-4340-85A3-A5531E510DB2}">
-      <thm15:themeFamily xmlns:thm15="http://schemas.microsoft.com/office/thememl/2012/main" name="Office Theme" id="{62F939B6-93AF-4DB8-9C6B-D6C7DFDC589F}" vid="{4A3C46E8-61CC-4603-A589-7422A47A8E4A}"/>
+      <thm15:themeFamily xmlns:thm15="http://schemas.microsoft.com/office/thememl/2012/main" xmlns="" name="Office Theme" id="{62F939B6-93AF-4DB8-9C6B-D6C7DFDC589F}" vid="{4A3C46E8-61CC-4603-A589-7422A47A8E4A}"/>
     </a:ext>
   </a:extLst>
 </a:theme>

</xml_diff>